<commit_message>
Added face recognition dataset for lab 4
</commit_message>
<xml_diff>
--- a/Lab-2/Lab-2.pptx
+++ b/Lab-2/Lab-2.pptx
@@ -1,48 +1,51 @@
 
 <file path=ppt/presentation.xml><?xml version="1.0" encoding="utf-8"?>
-<p:presentation xmlns:a="http://schemas.openxmlformats.org/drawingml/2006/main" xmlns:r="http://schemas.openxmlformats.org/officeDocument/2006/relationships" xmlns:p="http://schemas.openxmlformats.org/presentationml/2006/main" saveSubsetFonts="1" embedTrueTypeFonts="true">
+<p:presentation xmlns:a="http://schemas.openxmlformats.org/drawingml/2006/main" xmlns:r="http://schemas.openxmlformats.org/officeDocument/2006/relationships" xmlns:p="http://schemas.openxmlformats.org/presentationml/2006/main" embedTrueTypeFonts="1" saveSubsetFonts="1">
   <p:sldMasterIdLst>
     <p:sldMasterId id="2147483648" r:id="rId1"/>
   </p:sldMasterIdLst>
   <p:sldIdLst>
-    <p:sldId id="256" r:id="rId6"/>
-    <p:sldId id="257" r:id="rId7"/>
-    <p:sldId id="258" r:id="rId8"/>
-    <p:sldId id="259" r:id="rId9"/>
-    <p:sldId id="260" r:id="rId10"/>
-    <p:sldId id="261" r:id="rId11"/>
-    <p:sldId id="262" r:id="rId12"/>
-    <p:sldId id="263" r:id="rId13"/>
-    <p:sldId id="264" r:id="rId14"/>
-    <p:sldId id="265" r:id="rId15"/>
-    <p:sldId id="266" r:id="rId16"/>
-    <p:sldId id="267" r:id="rId17"/>
-    <p:sldId id="268" r:id="rId18"/>
-    <p:sldId id="269" r:id="rId19"/>
-    <p:sldId id="270" r:id="rId20"/>
+    <p:sldId id="256" r:id="rId2"/>
+    <p:sldId id="257" r:id="rId3"/>
+    <p:sldId id="258" r:id="rId4"/>
+    <p:sldId id="259" r:id="rId5"/>
+    <p:sldId id="260" r:id="rId6"/>
+    <p:sldId id="261" r:id="rId7"/>
+    <p:sldId id="262" r:id="rId8"/>
+    <p:sldId id="263" r:id="rId9"/>
+    <p:sldId id="264" r:id="rId10"/>
+    <p:sldId id="265" r:id="rId11"/>
+    <p:sldId id="266" r:id="rId12"/>
+    <p:sldId id="267" r:id="rId13"/>
+    <p:sldId id="268" r:id="rId14"/>
+    <p:sldId id="269" r:id="rId15"/>
+    <p:sldId id="270" r:id="rId16"/>
   </p:sldIdLst>
   <p:sldSz cx="18288000" cy="10287000"/>
   <p:notesSz cx="6858000" cy="9144000"/>
   <p:embeddedFontLst>
     <p:embeddedFont>
-      <p:font typeface="Now Bold" charset="1" panose="00000800000000000000"/>
-      <p:regular r:id="rId21"/>
+      <p:font typeface="Comic Sans" panose="020B0604020202020204" charset="0"/>
+      <p:regular r:id="rId17"/>
     </p:embeddedFont>
     <p:embeddedFont>
-      <p:font typeface="Comic Sans" charset="1" panose="03000702030302020204"/>
-      <p:regular r:id="rId22"/>
+      <p:font typeface="Libre Baskerville" panose="02000000000000000000" pitchFamily="2" charset="0"/>
+      <p:regular r:id="rId18"/>
+      <p:bold r:id="rId19"/>
+      <p:italic r:id="rId20"/>
     </p:embeddedFont>
     <p:embeddedFont>
-      <p:font typeface="Now" charset="1" panose="00000500000000000000"/>
+      <p:font typeface="Libre Baskerville Bold" panose="02000000000000000000" pitchFamily="2" charset="0"/>
+      <p:regular r:id="rId21"/>
+      <p:bold r:id="rId22"/>
+    </p:embeddedFont>
+    <p:embeddedFont>
+      <p:font typeface="Now" panose="020B0604020202020204" charset="0"/>
       <p:regular r:id="rId23"/>
     </p:embeddedFont>
     <p:embeddedFont>
-      <p:font typeface="Libre Baskerville Bold" charset="1" panose="02000000000000000000"/>
+      <p:font typeface="Now Bold" panose="020B0604020202020204" charset="0"/>
       <p:regular r:id="rId24"/>
-    </p:embeddedFont>
-    <p:embeddedFont>
-      <p:font typeface="Libre Baskerville" charset="1" panose="02000000000000000000"/>
-      <p:regular r:id="rId25"/>
     </p:embeddedFont>
   </p:embeddedFontLst>
   <p:defaultTextStyle>
@@ -140,6 +143,22 @@
       </a:defRPr>
     </a:lvl9pPr>
   </p:defaultTextStyle>
+  <p:extLst>
+    <p:ext uri="{EFAFB233-063F-42B5-8137-9DF3F51BA10A}">
+      <p15:sldGuideLst xmlns:p15="http://schemas.microsoft.com/office/powerpoint/2012/main">
+        <p15:guide id="1" orient="horz" pos="2160">
+          <p15:clr>
+            <a:srgbClr val="A4A3A4"/>
+          </p15:clr>
+        </p15:guide>
+        <p15:guide id="2" pos="2880">
+          <p15:clr>
+            <a:srgbClr val="A4A3A4"/>
+          </p15:clr>
+        </p15:guide>
+      </p15:sldGuideLst>
+    </p:ext>
+  </p:extLst>
 </p:presentation>
 </file>
 
@@ -181,10 +200,9 @@
           <a:lstStyle/>
           <a:p>
             <a:r>
-              <a:rPr lang="en-US" smtClean="0"/>
+              <a:rPr lang="en-US"/>
               <a:t>Click to edit Master title style</a:t>
             </a:r>
-            <a:endParaRPr lang="en-US"/>
           </a:p>
         </p:txBody>
       </p:sp>
@@ -300,10 +318,9 @@
           </a:lstStyle>
           <a:p>
             <a:r>
-              <a:rPr lang="en-US" smtClean="0"/>
+              <a:rPr lang="en-US"/>
               <a:t>Click to edit Master subtitle style</a:t>
             </a:r>
-            <a:endParaRPr lang="en-US"/>
           </a:p>
         </p:txBody>
       </p:sp>
@@ -325,7 +342,7 @@
             <a:fld id="{1D8BD707-D9CF-40AE-B4C6-C98DA3205C09}" type="datetimeFigureOut">
               <a:rPr lang="en-US" smtClean="0"/>
               <a:pPr/>
-              <a:t>8/1/2011</a:t>
+              <a:t>7/26/2024</a:t>
             </a:fld>
             <a:endParaRPr lang="en-US"/>
           </a:p>
@@ -415,10 +432,9 @@
           <a:lstStyle/>
           <a:p>
             <a:r>
-              <a:rPr lang="en-US" smtClean="0"/>
+              <a:rPr lang="en-US"/>
               <a:t>Click to edit Master title style</a:t>
             </a:r>
-            <a:endParaRPr lang="en-US"/>
           </a:p>
         </p:txBody>
       </p:sp>
@@ -439,38 +455,37 @@
           <a:p>
             <a:pPr lvl="0"/>
             <a:r>
-              <a:rPr lang="en-US" smtClean="0"/>
+              <a:rPr lang="en-US"/>
               <a:t>Click to edit Master text styles</a:t>
             </a:r>
           </a:p>
           <a:p>
             <a:pPr lvl="1"/>
             <a:r>
-              <a:rPr lang="en-US" smtClean="0"/>
+              <a:rPr lang="en-US"/>
               <a:t>Second level</a:t>
             </a:r>
           </a:p>
           <a:p>
             <a:pPr lvl="2"/>
             <a:r>
-              <a:rPr lang="en-US" smtClean="0"/>
+              <a:rPr lang="en-US"/>
               <a:t>Third level</a:t>
             </a:r>
           </a:p>
           <a:p>
             <a:pPr lvl="3"/>
             <a:r>
-              <a:rPr lang="en-US" smtClean="0"/>
+              <a:rPr lang="en-US"/>
               <a:t>Fourth level</a:t>
             </a:r>
           </a:p>
           <a:p>
             <a:pPr lvl="4"/>
             <a:r>
-              <a:rPr lang="en-US" smtClean="0"/>
+              <a:rPr lang="en-US"/>
               <a:t>Fifth level</a:t>
             </a:r>
-            <a:endParaRPr lang="en-US"/>
           </a:p>
         </p:txBody>
       </p:sp>
@@ -492,7 +507,7 @@
             <a:fld id="{1D8BD707-D9CF-40AE-B4C6-C98DA3205C09}" type="datetimeFigureOut">
               <a:rPr lang="en-US" smtClean="0"/>
               <a:pPr/>
-              <a:t>8/1/2011</a:t>
+              <a:t>7/26/2024</a:t>
             </a:fld>
             <a:endParaRPr lang="en-US"/>
           </a:p>
@@ -587,10 +602,9 @@
           <a:lstStyle/>
           <a:p>
             <a:r>
-              <a:rPr lang="en-US" smtClean="0"/>
+              <a:rPr lang="en-US"/>
               <a:t>Click to edit Master title style</a:t>
             </a:r>
-            <a:endParaRPr lang="en-US"/>
           </a:p>
         </p:txBody>
       </p:sp>
@@ -616,38 +630,37 @@
           <a:p>
             <a:pPr lvl="0"/>
             <a:r>
-              <a:rPr lang="en-US" smtClean="0"/>
+              <a:rPr lang="en-US"/>
               <a:t>Click to edit Master text styles</a:t>
             </a:r>
           </a:p>
           <a:p>
             <a:pPr lvl="1"/>
             <a:r>
-              <a:rPr lang="en-US" smtClean="0"/>
+              <a:rPr lang="en-US"/>
               <a:t>Second level</a:t>
             </a:r>
           </a:p>
           <a:p>
             <a:pPr lvl="2"/>
             <a:r>
-              <a:rPr lang="en-US" smtClean="0"/>
+              <a:rPr lang="en-US"/>
               <a:t>Third level</a:t>
             </a:r>
           </a:p>
           <a:p>
             <a:pPr lvl="3"/>
             <a:r>
-              <a:rPr lang="en-US" smtClean="0"/>
+              <a:rPr lang="en-US"/>
               <a:t>Fourth level</a:t>
             </a:r>
           </a:p>
           <a:p>
             <a:pPr lvl="4"/>
             <a:r>
-              <a:rPr lang="en-US" smtClean="0"/>
+              <a:rPr lang="en-US"/>
               <a:t>Fifth level</a:t>
             </a:r>
-            <a:endParaRPr lang="en-US"/>
           </a:p>
         </p:txBody>
       </p:sp>
@@ -669,7 +682,7 @@
             <a:fld id="{1D8BD707-D9CF-40AE-B4C6-C98DA3205C09}" type="datetimeFigureOut">
               <a:rPr lang="en-US" smtClean="0"/>
               <a:pPr/>
-              <a:t>8/1/2011</a:t>
+              <a:t>7/26/2024</a:t>
             </a:fld>
             <a:endParaRPr lang="en-US"/>
           </a:p>
@@ -759,10 +772,9 @@
           <a:lstStyle/>
           <a:p>
             <a:r>
-              <a:rPr lang="en-US" smtClean="0"/>
+              <a:rPr lang="en-US"/>
               <a:t>Click to edit Master title style</a:t>
             </a:r>
-            <a:endParaRPr lang="en-US"/>
           </a:p>
         </p:txBody>
       </p:sp>
@@ -783,38 +795,37 @@
           <a:p>
             <a:pPr lvl="0"/>
             <a:r>
-              <a:rPr lang="en-US" smtClean="0"/>
+              <a:rPr lang="en-US"/>
               <a:t>Click to edit Master text styles</a:t>
             </a:r>
           </a:p>
           <a:p>
             <a:pPr lvl="1"/>
             <a:r>
-              <a:rPr lang="en-US" smtClean="0"/>
+              <a:rPr lang="en-US"/>
               <a:t>Second level</a:t>
             </a:r>
           </a:p>
           <a:p>
             <a:pPr lvl="2"/>
             <a:r>
-              <a:rPr lang="en-US" smtClean="0"/>
+              <a:rPr lang="en-US"/>
               <a:t>Third level</a:t>
             </a:r>
           </a:p>
           <a:p>
             <a:pPr lvl="3"/>
             <a:r>
-              <a:rPr lang="en-US" smtClean="0"/>
+              <a:rPr lang="en-US"/>
               <a:t>Fourth level</a:t>
             </a:r>
           </a:p>
           <a:p>
             <a:pPr lvl="4"/>
             <a:r>
-              <a:rPr lang="en-US" smtClean="0"/>
+              <a:rPr lang="en-US"/>
               <a:t>Fifth level</a:t>
             </a:r>
-            <a:endParaRPr lang="en-US"/>
           </a:p>
         </p:txBody>
       </p:sp>
@@ -836,7 +847,7 @@
             <a:fld id="{1D8BD707-D9CF-40AE-B4C6-C98DA3205C09}" type="datetimeFigureOut">
               <a:rPr lang="en-US" smtClean="0"/>
               <a:pPr/>
-              <a:t>8/1/2011</a:t>
+              <a:t>7/26/2024</a:t>
             </a:fld>
             <a:endParaRPr lang="en-US"/>
           </a:p>
@@ -935,10 +946,9 @@
           </a:lstStyle>
           <a:p>
             <a:r>
-              <a:rPr lang="en-US" smtClean="0"/>
+              <a:rPr lang="en-US"/>
               <a:t>Click to edit Master title style</a:t>
             </a:r>
-            <a:endParaRPr lang="en-US"/>
           </a:p>
         </p:txBody>
       </p:sp>
@@ -1055,7 +1065,7 @@
           <a:p>
             <a:pPr lvl="0"/>
             <a:r>
-              <a:rPr lang="en-US" smtClean="0"/>
+              <a:rPr lang="en-US"/>
               <a:t>Click to edit Master text styles</a:t>
             </a:r>
           </a:p>
@@ -1079,7 +1089,7 @@
             <a:fld id="{1D8BD707-D9CF-40AE-B4C6-C98DA3205C09}" type="datetimeFigureOut">
               <a:rPr lang="en-US" smtClean="0"/>
               <a:pPr/>
-              <a:t>8/1/2011</a:t>
+              <a:t>7/26/2024</a:t>
             </a:fld>
             <a:endParaRPr lang="en-US"/>
           </a:p>
@@ -1169,10 +1179,9 @@
           <a:lstStyle/>
           <a:p>
             <a:r>
-              <a:rPr lang="en-US" smtClean="0"/>
+              <a:rPr lang="en-US"/>
               <a:t>Click to edit Master title style</a:t>
             </a:r>
-            <a:endParaRPr lang="en-US"/>
           </a:p>
         </p:txBody>
       </p:sp>
@@ -1226,38 +1235,37 @@
           <a:p>
             <a:pPr lvl="0"/>
             <a:r>
-              <a:rPr lang="en-US" smtClean="0"/>
+              <a:rPr lang="en-US"/>
               <a:t>Click to edit Master text styles</a:t>
             </a:r>
           </a:p>
           <a:p>
             <a:pPr lvl="1"/>
             <a:r>
-              <a:rPr lang="en-US" smtClean="0"/>
+              <a:rPr lang="en-US"/>
               <a:t>Second level</a:t>
             </a:r>
           </a:p>
           <a:p>
             <a:pPr lvl="2"/>
             <a:r>
-              <a:rPr lang="en-US" smtClean="0"/>
+              <a:rPr lang="en-US"/>
               <a:t>Third level</a:t>
             </a:r>
           </a:p>
           <a:p>
             <a:pPr lvl="3"/>
             <a:r>
-              <a:rPr lang="en-US" smtClean="0"/>
+              <a:rPr lang="en-US"/>
               <a:t>Fourth level</a:t>
             </a:r>
           </a:p>
           <a:p>
             <a:pPr lvl="4"/>
             <a:r>
-              <a:rPr lang="en-US" smtClean="0"/>
+              <a:rPr lang="en-US"/>
               <a:t>Fifth level</a:t>
             </a:r>
-            <a:endParaRPr lang="en-US"/>
           </a:p>
         </p:txBody>
       </p:sp>
@@ -1311,38 +1319,37 @@
           <a:p>
             <a:pPr lvl="0"/>
             <a:r>
-              <a:rPr lang="en-US" smtClean="0"/>
+              <a:rPr lang="en-US"/>
               <a:t>Click to edit Master text styles</a:t>
             </a:r>
           </a:p>
           <a:p>
             <a:pPr lvl="1"/>
             <a:r>
-              <a:rPr lang="en-US" smtClean="0"/>
+              <a:rPr lang="en-US"/>
               <a:t>Second level</a:t>
             </a:r>
           </a:p>
           <a:p>
             <a:pPr lvl="2"/>
             <a:r>
-              <a:rPr lang="en-US" smtClean="0"/>
+              <a:rPr lang="en-US"/>
               <a:t>Third level</a:t>
             </a:r>
           </a:p>
           <a:p>
             <a:pPr lvl="3"/>
             <a:r>
-              <a:rPr lang="en-US" smtClean="0"/>
+              <a:rPr lang="en-US"/>
               <a:t>Fourth level</a:t>
             </a:r>
           </a:p>
           <a:p>
             <a:pPr lvl="4"/>
             <a:r>
-              <a:rPr lang="en-US" smtClean="0"/>
+              <a:rPr lang="en-US"/>
               <a:t>Fifth level</a:t>
             </a:r>
-            <a:endParaRPr lang="en-US"/>
           </a:p>
         </p:txBody>
       </p:sp>
@@ -1364,7 +1371,7 @@
             <a:fld id="{1D8BD707-D9CF-40AE-B4C6-C98DA3205C09}" type="datetimeFigureOut">
               <a:rPr lang="en-US" smtClean="0"/>
               <a:pPr/>
-              <a:t>8/1/2011</a:t>
+              <a:t>7/26/2024</a:t>
             </a:fld>
             <a:endParaRPr lang="en-US"/>
           </a:p>
@@ -1458,10 +1465,9 @@
           </a:lstStyle>
           <a:p>
             <a:r>
-              <a:rPr lang="en-US" smtClean="0"/>
+              <a:rPr lang="en-US"/>
               <a:t>Click to edit Master title style</a:t>
             </a:r>
-            <a:endParaRPr lang="en-US"/>
           </a:p>
         </p:txBody>
       </p:sp>
@@ -1524,7 +1530,7 @@
           <a:p>
             <a:pPr lvl="0"/>
             <a:r>
-              <a:rPr lang="en-US" smtClean="0"/>
+              <a:rPr lang="en-US"/>
               <a:t>Click to edit Master text styles</a:t>
             </a:r>
           </a:p>
@@ -1580,38 +1586,37 @@
           <a:p>
             <a:pPr lvl="0"/>
             <a:r>
-              <a:rPr lang="en-US" smtClean="0"/>
+              <a:rPr lang="en-US"/>
               <a:t>Click to edit Master text styles</a:t>
             </a:r>
           </a:p>
           <a:p>
             <a:pPr lvl="1"/>
             <a:r>
-              <a:rPr lang="en-US" smtClean="0"/>
+              <a:rPr lang="en-US"/>
               <a:t>Second level</a:t>
             </a:r>
           </a:p>
           <a:p>
             <a:pPr lvl="2"/>
             <a:r>
-              <a:rPr lang="en-US" smtClean="0"/>
+              <a:rPr lang="en-US"/>
               <a:t>Third level</a:t>
             </a:r>
           </a:p>
           <a:p>
             <a:pPr lvl="3"/>
             <a:r>
-              <a:rPr lang="en-US" smtClean="0"/>
+              <a:rPr lang="en-US"/>
               <a:t>Fourth level</a:t>
             </a:r>
           </a:p>
           <a:p>
             <a:pPr lvl="4"/>
             <a:r>
-              <a:rPr lang="en-US" smtClean="0"/>
+              <a:rPr lang="en-US"/>
               <a:t>Fifth level</a:t>
             </a:r>
-            <a:endParaRPr lang="en-US"/>
           </a:p>
         </p:txBody>
       </p:sp>
@@ -1674,7 +1679,7 @@
           <a:p>
             <a:pPr lvl="0"/>
             <a:r>
-              <a:rPr lang="en-US" smtClean="0"/>
+              <a:rPr lang="en-US"/>
               <a:t>Click to edit Master text styles</a:t>
             </a:r>
           </a:p>
@@ -1730,38 +1735,37 @@
           <a:p>
             <a:pPr lvl="0"/>
             <a:r>
-              <a:rPr lang="en-US" smtClean="0"/>
+              <a:rPr lang="en-US"/>
               <a:t>Click to edit Master text styles</a:t>
             </a:r>
           </a:p>
           <a:p>
             <a:pPr lvl="1"/>
             <a:r>
-              <a:rPr lang="en-US" smtClean="0"/>
+              <a:rPr lang="en-US"/>
               <a:t>Second level</a:t>
             </a:r>
           </a:p>
           <a:p>
             <a:pPr lvl="2"/>
             <a:r>
-              <a:rPr lang="en-US" smtClean="0"/>
+              <a:rPr lang="en-US"/>
               <a:t>Third level</a:t>
             </a:r>
           </a:p>
           <a:p>
             <a:pPr lvl="3"/>
             <a:r>
-              <a:rPr lang="en-US" smtClean="0"/>
+              <a:rPr lang="en-US"/>
               <a:t>Fourth level</a:t>
             </a:r>
           </a:p>
           <a:p>
             <a:pPr lvl="4"/>
             <a:r>
-              <a:rPr lang="en-US" smtClean="0"/>
+              <a:rPr lang="en-US"/>
               <a:t>Fifth level</a:t>
             </a:r>
-            <a:endParaRPr lang="en-US"/>
           </a:p>
         </p:txBody>
       </p:sp>
@@ -1783,7 +1787,7 @@
             <a:fld id="{1D8BD707-D9CF-40AE-B4C6-C98DA3205C09}" type="datetimeFigureOut">
               <a:rPr lang="en-US" smtClean="0"/>
               <a:pPr/>
-              <a:t>8/1/2011</a:t>
+              <a:t>7/26/2024</a:t>
             </a:fld>
             <a:endParaRPr lang="en-US"/>
           </a:p>
@@ -1873,10 +1877,9 @@
           <a:lstStyle/>
           <a:p>
             <a:r>
-              <a:rPr lang="en-US" smtClean="0"/>
+              <a:rPr lang="en-US"/>
               <a:t>Click to edit Master title style</a:t>
             </a:r>
-            <a:endParaRPr lang="en-US"/>
           </a:p>
         </p:txBody>
       </p:sp>
@@ -1898,7 +1901,7 @@
             <a:fld id="{1D8BD707-D9CF-40AE-B4C6-C98DA3205C09}" type="datetimeFigureOut">
               <a:rPr lang="en-US" smtClean="0"/>
               <a:pPr/>
-              <a:t>8/1/2011</a:t>
+              <a:t>7/26/2024</a:t>
             </a:fld>
             <a:endParaRPr lang="en-US"/>
           </a:p>
@@ -1990,7 +1993,7 @@
             <a:fld id="{1D8BD707-D9CF-40AE-B4C6-C98DA3205C09}" type="datetimeFigureOut">
               <a:rPr lang="en-US" smtClean="0"/>
               <a:pPr/>
-              <a:t>8/1/2011</a:t>
+              <a:t>7/26/2024</a:t>
             </a:fld>
             <a:endParaRPr lang="en-US"/>
           </a:p>
@@ -2089,10 +2092,9 @@
           </a:lstStyle>
           <a:p>
             <a:r>
-              <a:rPr lang="en-US" smtClean="0"/>
+              <a:rPr lang="en-US"/>
               <a:t>Click to edit Master title style</a:t>
             </a:r>
-            <a:endParaRPr lang="en-US"/>
           </a:p>
         </p:txBody>
       </p:sp>
@@ -2146,38 +2148,37 @@
           <a:p>
             <a:pPr lvl="0"/>
             <a:r>
-              <a:rPr lang="en-US" smtClean="0"/>
+              <a:rPr lang="en-US"/>
               <a:t>Click to edit Master text styles</a:t>
             </a:r>
           </a:p>
           <a:p>
             <a:pPr lvl="1"/>
             <a:r>
-              <a:rPr lang="en-US" smtClean="0"/>
+              <a:rPr lang="en-US"/>
               <a:t>Second level</a:t>
             </a:r>
           </a:p>
           <a:p>
             <a:pPr lvl="2"/>
             <a:r>
-              <a:rPr lang="en-US" smtClean="0"/>
+              <a:rPr lang="en-US"/>
               <a:t>Third level</a:t>
             </a:r>
           </a:p>
           <a:p>
             <a:pPr lvl="3"/>
             <a:r>
-              <a:rPr lang="en-US" smtClean="0"/>
+              <a:rPr lang="en-US"/>
               <a:t>Fourth level</a:t>
             </a:r>
           </a:p>
           <a:p>
             <a:pPr lvl="4"/>
             <a:r>
-              <a:rPr lang="en-US" smtClean="0"/>
+              <a:rPr lang="en-US"/>
               <a:t>Fifth level</a:t>
             </a:r>
-            <a:endParaRPr lang="en-US"/>
           </a:p>
         </p:txBody>
       </p:sp>
@@ -2240,7 +2241,7 @@
           <a:p>
             <a:pPr lvl="0"/>
             <a:r>
-              <a:rPr lang="en-US" smtClean="0"/>
+              <a:rPr lang="en-US"/>
               <a:t>Click to edit Master text styles</a:t>
             </a:r>
           </a:p>
@@ -2264,7 +2265,7 @@
             <a:fld id="{1D8BD707-D9CF-40AE-B4C6-C98DA3205C09}" type="datetimeFigureOut">
               <a:rPr lang="en-US" smtClean="0"/>
               <a:pPr/>
-              <a:t>8/1/2011</a:t>
+              <a:t>7/26/2024</a:t>
             </a:fld>
             <a:endParaRPr lang="en-US"/>
           </a:p>
@@ -2363,10 +2364,9 @@
           </a:lstStyle>
           <a:p>
             <a:r>
-              <a:rPr lang="en-US" smtClean="0"/>
+              <a:rPr lang="en-US"/>
               <a:t>Click to edit Master title style</a:t>
             </a:r>
-            <a:endParaRPr lang="en-US"/>
           </a:p>
         </p:txBody>
       </p:sp>
@@ -2490,7 +2490,7 @@
           <a:p>
             <a:pPr lvl="0"/>
             <a:r>
-              <a:rPr lang="en-US" smtClean="0"/>
+              <a:rPr lang="en-US"/>
               <a:t>Click to edit Master text styles</a:t>
             </a:r>
           </a:p>
@@ -2514,7 +2514,7 @@
             <a:fld id="{1D8BD707-D9CF-40AE-B4C6-C98DA3205C09}" type="datetimeFigureOut">
               <a:rPr lang="en-US" smtClean="0"/>
               <a:pPr/>
-              <a:t>8/1/2011</a:t>
+              <a:t>7/26/2024</a:t>
             </a:fld>
             <a:endParaRPr lang="en-US"/>
           </a:p>
@@ -2619,10 +2619,9 @@
           <a:lstStyle/>
           <a:p>
             <a:r>
-              <a:rPr lang="en-US" smtClean="0"/>
+              <a:rPr lang="en-US"/>
               <a:t>Click to edit Master title style</a:t>
             </a:r>
-            <a:endParaRPr lang="en-US"/>
           </a:p>
         </p:txBody>
       </p:sp>
@@ -2653,38 +2652,37 @@
           <a:p>
             <a:pPr lvl="0"/>
             <a:r>
-              <a:rPr lang="en-US" smtClean="0"/>
+              <a:rPr lang="en-US"/>
               <a:t>Click to edit Master text styles</a:t>
             </a:r>
           </a:p>
           <a:p>
             <a:pPr lvl="1"/>
             <a:r>
-              <a:rPr lang="en-US" smtClean="0"/>
+              <a:rPr lang="en-US"/>
               <a:t>Second level</a:t>
             </a:r>
           </a:p>
           <a:p>
             <a:pPr lvl="2"/>
             <a:r>
-              <a:rPr lang="en-US" smtClean="0"/>
+              <a:rPr lang="en-US"/>
               <a:t>Third level</a:t>
             </a:r>
           </a:p>
           <a:p>
             <a:pPr lvl="3"/>
             <a:r>
-              <a:rPr lang="en-US" smtClean="0"/>
+              <a:rPr lang="en-US"/>
               <a:t>Fourth level</a:t>
             </a:r>
           </a:p>
           <a:p>
             <a:pPr lvl="4"/>
             <a:r>
-              <a:rPr lang="en-US" smtClean="0"/>
+              <a:rPr lang="en-US"/>
               <a:t>Fifth level</a:t>
             </a:r>
-            <a:endParaRPr lang="en-US"/>
           </a:p>
         </p:txBody>
       </p:sp>
@@ -2724,7 +2722,7 @@
             <a:fld id="{1D8BD707-D9CF-40AE-B4C6-C98DA3205C09}" type="datetimeFigureOut">
               <a:rPr lang="en-US" smtClean="0"/>
               <a:pPr/>
-              <a:t>8/1/2011</a:t>
+              <a:t>7/26/2024</a:t>
             </a:fld>
             <a:endParaRPr lang="en-US"/>
           </a:p>
@@ -3079,13 +3077,14 @@
 </file>
 
 <file path=ppt/slides/slide1.xml><?xml version="1.0" encoding="utf-8"?>
-<p:sld xmlns:p="http://schemas.openxmlformats.org/presentationml/2006/main" xmlns:a="http://schemas.openxmlformats.org/drawingml/2006/main">
+<p:sld xmlns:a="http://schemas.openxmlformats.org/drawingml/2006/main" xmlns:r="http://schemas.openxmlformats.org/officeDocument/2006/relationships" xmlns:p="http://schemas.openxmlformats.org/presentationml/2006/main">
   <p:cSld>
     <p:bg>
       <p:bgPr>
         <a:solidFill>
           <a:srgbClr val="F4F4F4"/>
         </a:solidFill>
+        <a:effectLst/>
       </p:bgPr>
     </p:bg>
     <p:spTree>
@@ -3104,12 +3103,12 @@
       </p:grpSpPr>
       <p:sp>
         <p:nvSpPr>
-          <p:cNvPr name="TextBox 2" id="2"/>
-          <p:cNvSpPr txBox="true"/>
+          <p:cNvPr id="2" name="TextBox 2"/>
+          <p:cNvSpPr txBox="1"/>
           <p:nvPr/>
         </p:nvSpPr>
         <p:spPr>
-          <a:xfrm rot="0">
+          <a:xfrm>
             <a:off x="3599506" y="2502158"/>
             <a:ext cx="11088988" cy="3190875"/>
           </a:xfrm>
@@ -3118,7 +3117,7 @@
           </a:prstGeom>
         </p:spPr>
         <p:txBody>
-          <a:bodyPr anchor="t" rtlCol="false" tIns="0" lIns="0" bIns="0" rIns="0">
+          <a:bodyPr lIns="0" tIns="0" rIns="0" bIns="0" rtlCol="0" anchor="t">
             <a:spAutoFit/>
           </a:bodyPr>
           <a:lstStyle/>
@@ -3145,12 +3144,12 @@
       </p:sp>
       <p:sp>
         <p:nvSpPr>
-          <p:cNvPr name="TextBox 3" id="3"/>
-          <p:cNvSpPr txBox="true"/>
+          <p:cNvPr id="3" name="TextBox 3"/>
+          <p:cNvSpPr txBox="1"/>
           <p:nvPr/>
         </p:nvSpPr>
         <p:spPr>
-          <a:xfrm rot="0">
+          <a:xfrm>
             <a:off x="4614700" y="6081602"/>
             <a:ext cx="9058600" cy="1441780"/>
           </a:xfrm>
@@ -3159,7 +3158,7 @@
           </a:prstGeom>
         </p:spPr>
         <p:txBody>
-          <a:bodyPr anchor="t" rtlCol="false" tIns="0" lIns="0" bIns="0" rIns="0">
+          <a:bodyPr lIns="0" tIns="0" rIns="0" bIns="0" rtlCol="0" anchor="t">
             <a:spAutoFit/>
           </a:bodyPr>
           <a:lstStyle/>
@@ -3207,6 +3206,15 @@
                 <a:spcPts val="2891"/>
               </a:lnSpc>
             </a:pPr>
+            <a:endParaRPr lang="en-US" sz="2370">
+              <a:solidFill>
+                <a:srgbClr val="000000"/>
+              </a:solidFill>
+              <a:latin typeface="Comic Sans"/>
+              <a:ea typeface="Comic Sans"/>
+              <a:cs typeface="Comic Sans"/>
+              <a:sym typeface="Comic Sans"/>
+            </a:endParaRPr>
           </a:p>
           <a:p>
             <a:pPr algn="ctr">
@@ -3238,13 +3246,14 @@
 </file>
 
 <file path=ppt/slides/slide10.xml><?xml version="1.0" encoding="utf-8"?>
-<p:sld xmlns:p="http://schemas.openxmlformats.org/presentationml/2006/main" xmlns:a="http://schemas.openxmlformats.org/drawingml/2006/main">
+<p:sld xmlns:a="http://schemas.openxmlformats.org/drawingml/2006/main" xmlns:r="http://schemas.openxmlformats.org/officeDocument/2006/relationships" xmlns:p="http://schemas.openxmlformats.org/presentationml/2006/main">
   <p:cSld>
     <p:bg>
       <p:bgPr>
         <a:solidFill>
           <a:srgbClr val="F4F4F4"/>
         </a:solidFill>
+        <a:effectLst/>
       </p:bgPr>
     </p:bg>
     <p:spTree>
@@ -3263,12 +3272,12 @@
       </p:grpSpPr>
       <p:sp>
         <p:nvSpPr>
-          <p:cNvPr name="TextBox 2" id="2"/>
-          <p:cNvSpPr txBox="true"/>
+          <p:cNvPr id="2" name="TextBox 2"/>
+          <p:cNvSpPr txBox="1"/>
           <p:nvPr/>
         </p:nvSpPr>
         <p:spPr>
-          <a:xfrm rot="0">
+          <a:xfrm>
             <a:off x="1028700" y="1019175"/>
             <a:ext cx="15795946" cy="1107366"/>
           </a:xfrm>
@@ -3277,7 +3286,7 @@
           </a:prstGeom>
         </p:spPr>
         <p:txBody>
-          <a:bodyPr anchor="t" rtlCol="false" tIns="0" lIns="0" bIns="0" rIns="0">
+          <a:bodyPr lIns="0" tIns="0" rIns="0" bIns="0" rtlCol="0" anchor="t">
             <a:spAutoFit/>
           </a:bodyPr>
           <a:lstStyle/>
@@ -3307,12 +3316,12 @@
       </p:sp>
       <p:sp>
         <p:nvSpPr>
-          <p:cNvPr name="TextBox 3" id="3"/>
-          <p:cNvSpPr txBox="true"/>
+          <p:cNvPr id="3" name="TextBox 3"/>
+          <p:cNvSpPr txBox="1"/>
           <p:nvPr/>
         </p:nvSpPr>
         <p:spPr>
-          <a:xfrm rot="0">
+          <a:xfrm>
             <a:off x="1028700" y="2654617"/>
             <a:ext cx="15795946" cy="7182231"/>
           </a:xfrm>
@@ -3321,12 +3330,12 @@
           </a:prstGeom>
         </p:spPr>
         <p:txBody>
-          <a:bodyPr anchor="t" rtlCol="false" tIns="0" lIns="0" bIns="0" rIns="0">
+          <a:bodyPr lIns="0" tIns="0" rIns="0" bIns="0" rtlCol="0" anchor="t">
             <a:spAutoFit/>
           </a:bodyPr>
           <a:lstStyle/>
           <a:p>
-            <a:pPr algn="l" marL="777240" indent="-388620" lvl="1">
+            <a:pPr marL="777240" lvl="1" indent="-388620" algn="l">
               <a:lnSpc>
                 <a:spcPts val="4392"/>
               </a:lnSpc>
@@ -3352,9 +3361,18 @@
                 <a:spcPts val="4392"/>
               </a:lnSpc>
             </a:pPr>
-          </a:p>
-          <a:p>
-            <a:pPr algn="l" marL="777240" indent="-388620" lvl="1">
+            <a:endParaRPr lang="en-US" sz="3600">
+              <a:solidFill>
+                <a:srgbClr val="000000"/>
+              </a:solidFill>
+              <a:latin typeface="Libre Baskerville"/>
+              <a:ea typeface="Libre Baskerville"/>
+              <a:cs typeface="Libre Baskerville"/>
+              <a:sym typeface="Libre Baskerville"/>
+            </a:endParaRPr>
+          </a:p>
+          <a:p>
+            <a:pPr marL="777240" lvl="1" indent="-388620" algn="l">
               <a:lnSpc>
                 <a:spcPts val="4392"/>
               </a:lnSpc>
@@ -3380,9 +3398,18 @@
                 <a:spcPts val="4392"/>
               </a:lnSpc>
             </a:pPr>
-          </a:p>
-          <a:p>
-            <a:pPr algn="l" marL="777240" indent="-388620" lvl="1">
+            <a:endParaRPr lang="en-US" sz="3600">
+              <a:solidFill>
+                <a:srgbClr val="000000"/>
+              </a:solidFill>
+              <a:latin typeface="Libre Baskerville"/>
+              <a:ea typeface="Libre Baskerville"/>
+              <a:cs typeface="Libre Baskerville"/>
+              <a:sym typeface="Libre Baskerville"/>
+            </a:endParaRPr>
+          </a:p>
+          <a:p>
+            <a:pPr marL="777240" lvl="1" indent="-388620" algn="l">
               <a:lnSpc>
                 <a:spcPts val="4392"/>
               </a:lnSpc>
@@ -3408,9 +3435,18 @@
                 <a:spcPts val="4392"/>
               </a:lnSpc>
             </a:pPr>
-          </a:p>
-          <a:p>
-            <a:pPr algn="l" marL="777240" indent="-388620" lvl="1">
+            <a:endParaRPr lang="en-US" sz="3600">
+              <a:solidFill>
+                <a:srgbClr val="000000"/>
+              </a:solidFill>
+              <a:latin typeface="Libre Baskerville"/>
+              <a:ea typeface="Libre Baskerville"/>
+              <a:cs typeface="Libre Baskerville"/>
+              <a:sym typeface="Libre Baskerville"/>
+            </a:endParaRPr>
+          </a:p>
+          <a:p>
+            <a:pPr marL="777240" lvl="1" indent="-388620" algn="l">
               <a:lnSpc>
                 <a:spcPts val="4392"/>
               </a:lnSpc>
@@ -3436,6 +3472,15 @@
                 <a:spcPts val="4392"/>
               </a:lnSpc>
             </a:pPr>
+            <a:endParaRPr lang="en-US" sz="3600">
+              <a:solidFill>
+                <a:srgbClr val="000000"/>
+              </a:solidFill>
+              <a:latin typeface="Libre Baskerville"/>
+              <a:ea typeface="Libre Baskerville"/>
+              <a:cs typeface="Libre Baskerville"/>
+              <a:sym typeface="Libre Baskerville"/>
+            </a:endParaRPr>
           </a:p>
         </p:txBody>
       </p:sp>
@@ -3448,13 +3493,14 @@
 </file>
 
 <file path=ppt/slides/slide11.xml><?xml version="1.0" encoding="utf-8"?>
-<p:sld xmlns:p="http://schemas.openxmlformats.org/presentationml/2006/main" xmlns:a="http://schemas.openxmlformats.org/drawingml/2006/main" xmlns:r="http://schemas.openxmlformats.org/officeDocument/2006/relationships">
+<p:sld xmlns:a="http://schemas.openxmlformats.org/drawingml/2006/main" xmlns:r="http://schemas.openxmlformats.org/officeDocument/2006/relationships" xmlns:p="http://schemas.openxmlformats.org/presentationml/2006/main">
   <p:cSld>
     <p:bg>
       <p:bgPr>
         <a:solidFill>
           <a:srgbClr val="F4F4F4"/>
         </a:solidFill>
+        <a:effectLst/>
       </p:bgPr>
     </p:bg>
     <p:spTree>
@@ -3473,12 +3519,12 @@
       </p:grpSpPr>
       <p:sp>
         <p:nvSpPr>
-          <p:cNvPr name="TextBox 2" id="2"/>
-          <p:cNvSpPr txBox="true"/>
+          <p:cNvPr id="2" name="TextBox 2"/>
+          <p:cNvSpPr txBox="1"/>
           <p:nvPr/>
         </p:nvSpPr>
         <p:spPr>
-          <a:xfrm rot="0">
+          <a:xfrm>
             <a:off x="1028700" y="2654617"/>
             <a:ext cx="16230600" cy="6811264"/>
           </a:xfrm>
@@ -3487,12 +3533,12 @@
           </a:prstGeom>
         </p:spPr>
         <p:txBody>
-          <a:bodyPr anchor="t" rtlCol="false" tIns="0" lIns="0" bIns="0" rIns="0">
+          <a:bodyPr lIns="0" tIns="0" rIns="0" bIns="0" rtlCol="0" anchor="t">
             <a:spAutoFit/>
           </a:bodyPr>
           <a:lstStyle/>
           <a:p>
-            <a:pPr algn="l" marL="734061" indent="-367031" lvl="1">
+            <a:pPr marL="734061" lvl="1" indent="-367031" algn="l">
               <a:lnSpc>
                 <a:spcPts val="4148"/>
               </a:lnSpc>
@@ -3518,6 +3564,15 @@
                 <a:spcPts val="4148"/>
               </a:lnSpc>
             </a:pPr>
+            <a:endParaRPr lang="en-US" sz="3400">
+              <a:solidFill>
+                <a:srgbClr val="000000"/>
+              </a:solidFill>
+              <a:latin typeface="Libre Baskerville"/>
+              <a:ea typeface="Libre Baskerville"/>
+              <a:cs typeface="Libre Baskerville"/>
+              <a:sym typeface="Libre Baskerville"/>
+            </a:endParaRPr>
           </a:p>
           <a:p>
             <a:pPr algn="l">
@@ -3525,6 +3580,15 @@
                 <a:spcPts val="4148"/>
               </a:lnSpc>
             </a:pPr>
+            <a:endParaRPr lang="en-US" sz="3400">
+              <a:solidFill>
+                <a:srgbClr val="000000"/>
+              </a:solidFill>
+              <a:latin typeface="Libre Baskerville"/>
+              <a:ea typeface="Libre Baskerville"/>
+              <a:cs typeface="Libre Baskerville"/>
+              <a:sym typeface="Libre Baskerville"/>
+            </a:endParaRPr>
           </a:p>
           <a:p>
             <a:pPr algn="l">
@@ -3532,6 +3596,15 @@
                 <a:spcPts val="4148"/>
               </a:lnSpc>
             </a:pPr>
+            <a:endParaRPr lang="en-US" sz="3400">
+              <a:solidFill>
+                <a:srgbClr val="000000"/>
+              </a:solidFill>
+              <a:latin typeface="Libre Baskerville"/>
+              <a:ea typeface="Libre Baskerville"/>
+              <a:cs typeface="Libre Baskerville"/>
+              <a:sym typeface="Libre Baskerville"/>
+            </a:endParaRPr>
           </a:p>
           <a:p>
             <a:pPr algn="l">
@@ -3577,9 +3650,18 @@
                 <a:spcPts val="4148"/>
               </a:lnSpc>
             </a:pPr>
-          </a:p>
-          <a:p>
-            <a:pPr algn="l" marL="734061" indent="-367031" lvl="1">
+            <a:endParaRPr lang="en-US" sz="3400">
+              <a:solidFill>
+                <a:srgbClr val="000000"/>
+              </a:solidFill>
+              <a:latin typeface="Libre Baskerville"/>
+              <a:ea typeface="Libre Baskerville"/>
+              <a:cs typeface="Libre Baskerville"/>
+              <a:sym typeface="Libre Baskerville"/>
+            </a:endParaRPr>
+          </a:p>
+          <a:p>
+            <a:pPr marL="734061" lvl="1" indent="-367031" algn="l">
               <a:lnSpc>
                 <a:spcPts val="4148"/>
               </a:lnSpc>
@@ -3605,9 +3687,18 @@
                 <a:spcPts val="4148"/>
               </a:lnSpc>
             </a:pPr>
-          </a:p>
-          <a:p>
-            <a:pPr algn="l" marL="734061" indent="-367031" lvl="1">
+            <a:endParaRPr lang="en-US" sz="3400">
+              <a:solidFill>
+                <a:srgbClr val="000000"/>
+              </a:solidFill>
+              <a:latin typeface="Libre Baskerville"/>
+              <a:ea typeface="Libre Baskerville"/>
+              <a:cs typeface="Libre Baskerville"/>
+              <a:sym typeface="Libre Baskerville"/>
+            </a:endParaRPr>
+          </a:p>
+          <a:p>
+            <a:pPr marL="734061" lvl="1" indent="-367031" algn="l">
               <a:lnSpc>
                 <a:spcPts val="4148"/>
               </a:lnSpc>
@@ -3631,12 +3722,12 @@
       </p:sp>
       <p:sp>
         <p:nvSpPr>
-          <p:cNvPr name="Freeform 3" id="3"/>
+          <p:cNvPr id="3" name="Freeform 3"/>
           <p:cNvSpPr/>
           <p:nvPr/>
         </p:nvSpPr>
         <p:spPr>
-          <a:xfrm flipH="false" flipV="false" rot="0">
+          <a:xfrm>
             <a:off x="4265788" y="4018345"/>
             <a:ext cx="9756424" cy="1009732"/>
           </a:xfrm>
@@ -3645,9 +3736,9 @@
             <a:gdLst/>
             <a:ahLst/>
             <a:cxnLst/>
-            <a:rect r="r" b="b" t="t" l="l"/>
+            <a:rect l="l" t="t" r="r" b="b"/>
             <a:pathLst>
-              <a:path h="1009732" w="9756424">
+              <a:path w="9756424" h="1009732">
                 <a:moveTo>
                   <a:pt x="0" y="0"/>
                 </a:moveTo>
@@ -3670,19 +3761,26 @@
           <a:blipFill>
             <a:blip r:embed="rId2"/>
             <a:stretch>
-              <a:fillRect l="0" t="-130028" r="0" b="-345789"/>
+              <a:fillRect t="-130028" b="-345789"/>
             </a:stretch>
           </a:blipFill>
         </p:spPr>
-      </p:sp>
-      <p:sp>
-        <p:nvSpPr>
-          <p:cNvPr name="TextBox 4" id="4"/>
-          <p:cNvSpPr txBox="true"/>
+        <p:txBody>
+          <a:bodyPr/>
+          <a:lstStyle/>
+          <a:p>
+            <a:endParaRPr lang="en-IN"/>
+          </a:p>
+        </p:txBody>
+      </p:sp>
+      <p:sp>
+        <p:nvSpPr>
+          <p:cNvPr id="4" name="TextBox 4"/>
+          <p:cNvSpPr txBox="1"/>
           <p:nvPr/>
         </p:nvSpPr>
         <p:spPr>
-          <a:xfrm rot="0">
+          <a:xfrm>
             <a:off x="1028700" y="1019175"/>
             <a:ext cx="15795946" cy="1107366"/>
           </a:xfrm>
@@ -3691,7 +3789,7 @@
           </a:prstGeom>
         </p:spPr>
         <p:txBody>
-          <a:bodyPr anchor="t" rtlCol="false" tIns="0" lIns="0" bIns="0" rIns="0">
+          <a:bodyPr lIns="0" tIns="0" rIns="0" bIns="0" rtlCol="0" anchor="t">
             <a:spAutoFit/>
           </a:bodyPr>
           <a:lstStyle/>
@@ -3728,13 +3826,14 @@
 </file>
 
 <file path=ppt/slides/slide12.xml><?xml version="1.0" encoding="utf-8"?>
-<p:sld xmlns:p="http://schemas.openxmlformats.org/presentationml/2006/main" xmlns:a="http://schemas.openxmlformats.org/drawingml/2006/main" xmlns:r="http://schemas.openxmlformats.org/officeDocument/2006/relationships">
+<p:sld xmlns:a="http://schemas.openxmlformats.org/drawingml/2006/main" xmlns:r="http://schemas.openxmlformats.org/officeDocument/2006/relationships" xmlns:p="http://schemas.openxmlformats.org/presentationml/2006/main">
   <p:cSld>
     <p:bg>
       <p:bgPr>
         <a:solidFill>
           <a:srgbClr val="F4F4F4"/>
         </a:solidFill>
+        <a:effectLst/>
       </p:bgPr>
     </p:bg>
     <p:spTree>
@@ -3753,12 +3852,12 @@
       </p:grpSpPr>
       <p:sp>
         <p:nvSpPr>
-          <p:cNvPr name="TextBox 2" id="2"/>
-          <p:cNvSpPr txBox="true"/>
+          <p:cNvPr id="2" name="TextBox 2"/>
+          <p:cNvSpPr txBox="1"/>
           <p:nvPr/>
         </p:nvSpPr>
         <p:spPr>
-          <a:xfrm rot="0">
+          <a:xfrm>
             <a:off x="1028700" y="2654617"/>
             <a:ext cx="15795946" cy="7335139"/>
           </a:xfrm>
@@ -3767,12 +3866,12 @@
           </a:prstGeom>
         </p:spPr>
         <p:txBody>
-          <a:bodyPr anchor="t" rtlCol="false" tIns="0" lIns="0" bIns="0" rIns="0">
+          <a:bodyPr lIns="0" tIns="0" rIns="0" bIns="0" rtlCol="0" anchor="t">
             <a:spAutoFit/>
           </a:bodyPr>
           <a:lstStyle/>
           <a:p>
-            <a:pPr algn="l" marL="734059" indent="-367030" lvl="1">
+            <a:pPr marL="734059" lvl="1" indent="-367030" algn="l">
               <a:lnSpc>
                 <a:spcPts val="4147"/>
               </a:lnSpc>
@@ -3798,6 +3897,15 @@
                 <a:spcPts val="4147"/>
               </a:lnSpc>
             </a:pPr>
+            <a:endParaRPr lang="en-US" sz="3399">
+              <a:solidFill>
+                <a:srgbClr val="000000"/>
+              </a:solidFill>
+              <a:latin typeface="Libre Baskerville"/>
+              <a:ea typeface="Libre Baskerville"/>
+              <a:cs typeface="Libre Baskerville"/>
+              <a:sym typeface="Libre Baskerville"/>
+            </a:endParaRPr>
           </a:p>
           <a:p>
             <a:pPr algn="l">
@@ -3805,6 +3913,15 @@
                 <a:spcPts val="4147"/>
               </a:lnSpc>
             </a:pPr>
+            <a:endParaRPr lang="en-US" sz="3399">
+              <a:solidFill>
+                <a:srgbClr val="000000"/>
+              </a:solidFill>
+              <a:latin typeface="Libre Baskerville"/>
+              <a:ea typeface="Libre Baskerville"/>
+              <a:cs typeface="Libre Baskerville"/>
+              <a:sym typeface="Libre Baskerville"/>
+            </a:endParaRPr>
           </a:p>
           <a:p>
             <a:pPr algn="l">
@@ -3812,6 +3929,15 @@
                 <a:spcPts val="4147"/>
               </a:lnSpc>
             </a:pPr>
+            <a:endParaRPr lang="en-US" sz="3399">
+              <a:solidFill>
+                <a:srgbClr val="000000"/>
+              </a:solidFill>
+              <a:latin typeface="Libre Baskerville"/>
+              <a:ea typeface="Libre Baskerville"/>
+              <a:cs typeface="Libre Baskerville"/>
+              <a:sym typeface="Libre Baskerville"/>
+            </a:endParaRPr>
           </a:p>
           <a:p>
             <a:pPr algn="l">
@@ -3857,9 +3983,18 @@
                 <a:spcPts val="4147"/>
               </a:lnSpc>
             </a:pPr>
-          </a:p>
-          <a:p>
-            <a:pPr algn="l" marL="734059" indent="-367030" lvl="1">
+            <a:endParaRPr lang="en-US" sz="3399">
+              <a:solidFill>
+                <a:srgbClr val="000000"/>
+              </a:solidFill>
+              <a:latin typeface="Libre Baskerville"/>
+              <a:ea typeface="Libre Baskerville"/>
+              <a:cs typeface="Libre Baskerville"/>
+              <a:sym typeface="Libre Baskerville"/>
+            </a:endParaRPr>
+          </a:p>
+          <a:p>
+            <a:pPr marL="734059" lvl="1" indent="-367030" algn="l">
               <a:lnSpc>
                 <a:spcPts val="4147"/>
               </a:lnSpc>
@@ -3885,9 +4020,18 @@
                 <a:spcPts val="4147"/>
               </a:lnSpc>
             </a:pPr>
-          </a:p>
-          <a:p>
-            <a:pPr algn="l" marL="734059" indent="-367030" lvl="1">
+            <a:endParaRPr lang="en-US" sz="3399">
+              <a:solidFill>
+                <a:srgbClr val="000000"/>
+              </a:solidFill>
+              <a:latin typeface="Libre Baskerville"/>
+              <a:ea typeface="Libre Baskerville"/>
+              <a:cs typeface="Libre Baskerville"/>
+              <a:sym typeface="Libre Baskerville"/>
+            </a:endParaRPr>
+          </a:p>
+          <a:p>
+            <a:pPr marL="734059" lvl="1" indent="-367030" algn="l">
               <a:lnSpc>
                 <a:spcPts val="4147"/>
               </a:lnSpc>
@@ -3913,17 +4057,26 @@
                 <a:spcPts val="4147"/>
               </a:lnSpc>
             </a:pPr>
-          </a:p>
-        </p:txBody>
-      </p:sp>
-      <p:sp>
-        <p:nvSpPr>
-          <p:cNvPr name="TextBox 3" id="3"/>
-          <p:cNvSpPr txBox="true"/>
+            <a:endParaRPr lang="en-US" sz="3399">
+              <a:solidFill>
+                <a:srgbClr val="000000"/>
+              </a:solidFill>
+              <a:latin typeface="Libre Baskerville"/>
+              <a:ea typeface="Libre Baskerville"/>
+              <a:cs typeface="Libre Baskerville"/>
+              <a:sym typeface="Libre Baskerville"/>
+            </a:endParaRPr>
+          </a:p>
+        </p:txBody>
+      </p:sp>
+      <p:sp>
+        <p:nvSpPr>
+          <p:cNvPr id="3" name="TextBox 3"/>
+          <p:cNvSpPr txBox="1"/>
           <p:nvPr/>
         </p:nvSpPr>
         <p:spPr>
-          <a:xfrm rot="0">
+          <a:xfrm>
             <a:off x="1028700" y="1019175"/>
             <a:ext cx="15795946" cy="1107366"/>
           </a:xfrm>
@@ -3932,7 +4085,7 @@
           </a:prstGeom>
         </p:spPr>
         <p:txBody>
-          <a:bodyPr anchor="t" rtlCol="false" tIns="0" lIns="0" bIns="0" rIns="0">
+          <a:bodyPr lIns="0" tIns="0" rIns="0" bIns="0" rtlCol="0" anchor="t">
             <a:spAutoFit/>
           </a:bodyPr>
           <a:lstStyle/>
@@ -3962,12 +4115,12 @@
       </p:sp>
       <p:sp>
         <p:nvSpPr>
-          <p:cNvPr name="Freeform 4" id="4"/>
+          <p:cNvPr id="4" name="Freeform 4"/>
           <p:cNvSpPr/>
           <p:nvPr/>
         </p:nvSpPr>
         <p:spPr>
-          <a:xfrm flipH="false" flipV="false" rot="0">
+          <a:xfrm>
             <a:off x="4265788" y="4047201"/>
             <a:ext cx="9756424" cy="1009732"/>
           </a:xfrm>
@@ -3976,9 +4129,9 @@
             <a:gdLst/>
             <a:ahLst/>
             <a:cxnLst/>
-            <a:rect r="r" b="b" t="t" l="l"/>
+            <a:rect l="l" t="t" r="r" b="b"/>
             <a:pathLst>
-              <a:path h="1009732" w="9756424">
+              <a:path w="9756424" h="1009732">
                 <a:moveTo>
                   <a:pt x="0" y="0"/>
                 </a:moveTo>
@@ -4001,10 +4154,17 @@
           <a:blipFill>
             <a:blip r:embed="rId2"/>
             <a:stretch>
-              <a:fillRect l="0" t="-130028" r="0" b="-345789"/>
+              <a:fillRect t="-130028" b="-345789"/>
             </a:stretch>
           </a:blipFill>
         </p:spPr>
+        <p:txBody>
+          <a:bodyPr/>
+          <a:lstStyle/>
+          <a:p>
+            <a:endParaRPr lang="en-IN"/>
+          </a:p>
+        </p:txBody>
       </p:sp>
     </p:spTree>
   </p:cSld>
@@ -4015,13 +4175,14 @@
 </file>
 
 <file path=ppt/slides/slide13.xml><?xml version="1.0" encoding="utf-8"?>
-<p:sld xmlns:p="http://schemas.openxmlformats.org/presentationml/2006/main" xmlns:a="http://schemas.openxmlformats.org/drawingml/2006/main">
+<p:sld xmlns:a="http://schemas.openxmlformats.org/drawingml/2006/main" xmlns:r="http://schemas.openxmlformats.org/officeDocument/2006/relationships" xmlns:p="http://schemas.openxmlformats.org/presentationml/2006/main">
   <p:cSld>
     <p:bg>
       <p:bgPr>
         <a:solidFill>
           <a:srgbClr val="F4F4F4"/>
         </a:solidFill>
+        <a:effectLst/>
       </p:bgPr>
     </p:bg>
     <p:spTree>
@@ -4040,12 +4201,12 @@
       </p:grpSpPr>
       <p:sp>
         <p:nvSpPr>
-          <p:cNvPr name="TextBox 2" id="2"/>
-          <p:cNvSpPr txBox="true"/>
+          <p:cNvPr id="2" name="TextBox 2"/>
+          <p:cNvSpPr txBox="1"/>
           <p:nvPr/>
         </p:nvSpPr>
         <p:spPr>
-          <a:xfrm rot="0">
+          <a:xfrm>
             <a:off x="1246027" y="3691034"/>
             <a:ext cx="15795946" cy="3668014"/>
           </a:xfrm>
@@ -4054,7 +4215,7 @@
           </a:prstGeom>
         </p:spPr>
         <p:txBody>
-          <a:bodyPr anchor="t" rtlCol="false" tIns="0" lIns="0" bIns="0" rIns="0">
+          <a:bodyPr lIns="0" tIns="0" rIns="0" bIns="0" rtlCol="0" anchor="t">
             <a:spAutoFit/>
           </a:bodyPr>
           <a:lstStyle/>
@@ -4089,14 +4250,15 @@
               <a:t> </a:t>
             </a:r>
             <a:r>
-              <a:rPr lang="en-US" sz="3399">
-                <a:solidFill>
-                  <a:srgbClr val="FF3131"/>
+              <a:rPr lang="en-US" sz="3399" u="sng">
+                <a:solidFill>
+                  <a:srgbClr val="8C52FF"/>
                 </a:solidFill>
                 <a:latin typeface="Libre Baskerville Bold"/>
                 <a:ea typeface="Libre Baskerville Bold"/>
                 <a:cs typeface="Libre Baskerville Bold"/>
                 <a:sym typeface="Libre Baskerville Bold"/>
+                <a:hlinkClick r:id="rId2" tooltip="https://colab.research.google.com/drive/14CKItbXtE3FprIXAEaDP38H6LMwgOx3t?usp=sharing"/>
               </a:rPr>
               <a:t>https://colab.research.google.com/drive/14CKItbXtE3FprIXAEaDP38H6LMwgOx3t?usp=sharing&amp;authuser=2#scrollTo=YbLarQ5d6yXb</a:t>
             </a:r>
@@ -4107,6 +4269,16 @@
                 <a:spcPts val="4147"/>
               </a:lnSpc>
             </a:pPr>
+            <a:endParaRPr lang="en-US" sz="3399" u="sng">
+              <a:solidFill>
+                <a:srgbClr val="8C52FF"/>
+              </a:solidFill>
+              <a:latin typeface="Libre Baskerville Bold"/>
+              <a:ea typeface="Libre Baskerville Bold"/>
+              <a:cs typeface="Libre Baskerville Bold"/>
+              <a:sym typeface="Libre Baskerville Bold"/>
+              <a:hlinkClick r:id="rId2" tooltip="https://colab.research.google.com/drive/14CKItbXtE3FprIXAEaDP38H6LMwgOx3t?usp=sharing"/>
+            </a:endParaRPr>
           </a:p>
           <a:p>
             <a:pPr algn="ctr">
@@ -4139,14 +4311,15 @@
               <a:t> </a:t>
             </a:r>
             <a:r>
-              <a:rPr lang="en-US" sz="3399">
-                <a:solidFill>
-                  <a:srgbClr val="FF3131"/>
+              <a:rPr lang="en-US" sz="3399" u="sng">
+                <a:solidFill>
+                  <a:srgbClr val="8C52FF"/>
                 </a:solidFill>
                 <a:latin typeface="Libre Baskerville Bold"/>
                 <a:ea typeface="Libre Baskerville Bold"/>
                 <a:cs typeface="Libre Baskerville Bold"/>
                 <a:sym typeface="Libre Baskerville Bold"/>
+                <a:hlinkClick r:id="rId3" tooltip="https://colab.research.google.com/drive/1sarHQQiqBN2clJ2QEU4-hFfAcYF7Pxqi?usp=sharing"/>
               </a:rPr>
               <a:t>https://colab.research.google.com/drive/1sarHQQiqBN2clJ2QEU4-hFfAcYF7Pxqi?usp=sharing</a:t>
             </a:r>
@@ -4155,12 +4328,12 @@
       </p:sp>
       <p:sp>
         <p:nvSpPr>
-          <p:cNvPr name="TextBox 3" id="3"/>
-          <p:cNvSpPr txBox="true"/>
+          <p:cNvPr id="3" name="TextBox 3"/>
+          <p:cNvSpPr txBox="1"/>
           <p:nvPr/>
         </p:nvSpPr>
         <p:spPr>
-          <a:xfrm rot="0">
+          <a:xfrm>
             <a:off x="1028700" y="1019175"/>
             <a:ext cx="15795946" cy="1107366"/>
           </a:xfrm>
@@ -4169,7 +4342,7 @@
           </a:prstGeom>
         </p:spPr>
         <p:txBody>
-          <a:bodyPr anchor="t" rtlCol="false" tIns="0" lIns="0" bIns="0" rIns="0">
+          <a:bodyPr lIns="0" tIns="0" rIns="0" bIns="0" rtlCol="0" anchor="t">
             <a:spAutoFit/>
           </a:bodyPr>
           <a:lstStyle/>
@@ -4206,13 +4379,14 @@
 </file>
 
 <file path=ppt/slides/slide14.xml><?xml version="1.0" encoding="utf-8"?>
-<p:sld xmlns:p="http://schemas.openxmlformats.org/presentationml/2006/main" xmlns:a="http://schemas.openxmlformats.org/drawingml/2006/main">
+<p:sld xmlns:a="http://schemas.openxmlformats.org/drawingml/2006/main" xmlns:r="http://schemas.openxmlformats.org/officeDocument/2006/relationships" xmlns:p="http://schemas.openxmlformats.org/presentationml/2006/main">
   <p:cSld>
     <p:bg>
       <p:bgPr>
         <a:solidFill>
           <a:srgbClr val="F4F4F4"/>
         </a:solidFill>
+        <a:effectLst/>
       </p:bgPr>
     </p:bg>
     <p:spTree>
@@ -4231,12 +4405,12 @@
       </p:grpSpPr>
       <p:sp>
         <p:nvSpPr>
-          <p:cNvPr name="TextBox 2" id="2"/>
-          <p:cNvSpPr txBox="true"/>
+          <p:cNvPr id="2" name="TextBox 2"/>
+          <p:cNvSpPr txBox="1"/>
           <p:nvPr/>
         </p:nvSpPr>
         <p:spPr>
-          <a:xfrm rot="0">
+          <a:xfrm>
             <a:off x="1246027" y="2733892"/>
             <a:ext cx="15795946" cy="7193280"/>
           </a:xfrm>
@@ -4245,7 +4419,7 @@
           </a:prstGeom>
         </p:spPr>
         <p:txBody>
-          <a:bodyPr anchor="t" rtlCol="false" tIns="0" lIns="0" bIns="0" rIns="0">
+          <a:bodyPr lIns="0" tIns="0" rIns="0" bIns="0" rtlCol="0" anchor="t">
             <a:spAutoFit/>
           </a:bodyPr>
           <a:lstStyle/>
@@ -4293,6 +4467,15 @@
                 <a:spcPts val="3659"/>
               </a:lnSpc>
             </a:pPr>
+            <a:endParaRPr lang="en-US" sz="2999">
+              <a:solidFill>
+                <a:srgbClr val="010101"/>
+              </a:solidFill>
+              <a:latin typeface="Libre Baskerville"/>
+              <a:ea typeface="Libre Baskerville"/>
+              <a:cs typeface="Libre Baskerville"/>
+              <a:sym typeface="Libre Baskerville"/>
+            </a:endParaRPr>
           </a:p>
           <a:p>
             <a:pPr algn="l">
@@ -4300,6 +4483,15 @@
                 <a:spcPts val="3659"/>
               </a:lnSpc>
             </a:pPr>
+            <a:endParaRPr lang="en-US" sz="2999">
+              <a:solidFill>
+                <a:srgbClr val="010101"/>
+              </a:solidFill>
+              <a:latin typeface="Libre Baskerville"/>
+              <a:ea typeface="Libre Baskerville"/>
+              <a:cs typeface="Libre Baskerville"/>
+              <a:sym typeface="Libre Baskerville"/>
+            </a:endParaRPr>
           </a:p>
           <a:p>
             <a:pPr algn="l">
@@ -4364,6 +4556,15 @@
                 <a:spcPts val="3172"/>
               </a:lnSpc>
             </a:pPr>
+            <a:endParaRPr lang="en-US" sz="2600">
+              <a:solidFill>
+                <a:srgbClr val="7F7EF9"/>
+              </a:solidFill>
+              <a:latin typeface="Libre Baskerville"/>
+              <a:ea typeface="Libre Baskerville"/>
+              <a:cs typeface="Libre Baskerville"/>
+              <a:sym typeface="Libre Baskerville"/>
+            </a:endParaRPr>
           </a:p>
           <a:p>
             <a:pPr algn="l">
@@ -4388,12 +4589,12 @@
       </p:sp>
       <p:sp>
         <p:nvSpPr>
-          <p:cNvPr name="TextBox 3" id="3"/>
-          <p:cNvSpPr txBox="true"/>
+          <p:cNvPr id="3" name="TextBox 3"/>
+          <p:cNvSpPr txBox="1"/>
           <p:nvPr/>
         </p:nvSpPr>
         <p:spPr>
-          <a:xfrm rot="0">
+          <a:xfrm>
             <a:off x="1028700" y="1019175"/>
             <a:ext cx="15795946" cy="1107366"/>
           </a:xfrm>
@@ -4402,7 +4603,7 @@
           </a:prstGeom>
         </p:spPr>
         <p:txBody>
-          <a:bodyPr anchor="t" rtlCol="false" tIns="0" lIns="0" bIns="0" rIns="0">
+          <a:bodyPr lIns="0" tIns="0" rIns="0" bIns="0" rtlCol="0" anchor="t">
             <a:spAutoFit/>
           </a:bodyPr>
           <a:lstStyle/>
@@ -4439,13 +4640,14 @@
 </file>
 
 <file path=ppt/slides/slide15.xml><?xml version="1.0" encoding="utf-8"?>
-<p:sld xmlns:p="http://schemas.openxmlformats.org/presentationml/2006/main" xmlns:a="http://schemas.openxmlformats.org/drawingml/2006/main">
+<p:sld xmlns:a="http://schemas.openxmlformats.org/drawingml/2006/main" xmlns:r="http://schemas.openxmlformats.org/officeDocument/2006/relationships" xmlns:p="http://schemas.openxmlformats.org/presentationml/2006/main">
   <p:cSld>
     <p:bg>
       <p:bgPr>
         <a:solidFill>
           <a:srgbClr val="F4F4F4"/>
         </a:solidFill>
+        <a:effectLst/>
       </p:bgPr>
     </p:bg>
     <p:spTree>
@@ -4464,12 +4666,12 @@
       </p:grpSpPr>
       <p:sp>
         <p:nvSpPr>
-          <p:cNvPr name="TextBox 2" id="2"/>
-          <p:cNvSpPr txBox="true"/>
+          <p:cNvPr id="2" name="TextBox 2"/>
+          <p:cNvSpPr txBox="1"/>
           <p:nvPr/>
         </p:nvSpPr>
         <p:spPr>
-          <a:xfrm rot="0">
+          <a:xfrm>
             <a:off x="1028700" y="1019175"/>
             <a:ext cx="15795946" cy="1107366"/>
           </a:xfrm>
@@ -4478,7 +4680,7 @@
           </a:prstGeom>
         </p:spPr>
         <p:txBody>
-          <a:bodyPr anchor="t" rtlCol="false" tIns="0" lIns="0" bIns="0" rIns="0">
+          <a:bodyPr lIns="0" tIns="0" rIns="0" bIns="0" rtlCol="0" anchor="t">
             <a:spAutoFit/>
           </a:bodyPr>
           <a:lstStyle/>
@@ -4508,12 +4710,12 @@
       </p:sp>
       <p:sp>
         <p:nvSpPr>
-          <p:cNvPr name="TextBox 3" id="3"/>
-          <p:cNvSpPr txBox="true"/>
+          <p:cNvPr id="3" name="TextBox 3"/>
+          <p:cNvSpPr txBox="1"/>
           <p:nvPr/>
         </p:nvSpPr>
         <p:spPr>
-          <a:xfrm rot="0">
+          <a:xfrm>
             <a:off x="1028700" y="2654617"/>
             <a:ext cx="15795946" cy="6384163"/>
           </a:xfrm>
@@ -4522,12 +4724,12 @@
           </a:prstGeom>
         </p:spPr>
         <p:txBody>
-          <a:bodyPr anchor="t" rtlCol="false" tIns="0" lIns="0" bIns="0" rIns="0">
+          <a:bodyPr lIns="0" tIns="0" rIns="0" bIns="0" rtlCol="0" anchor="t">
             <a:spAutoFit/>
           </a:bodyPr>
           <a:lstStyle/>
           <a:p>
-            <a:pPr algn="l" marL="777240" indent="-388620" lvl="1">
+            <a:pPr marL="777240" lvl="1" indent="-388620" algn="l">
               <a:lnSpc>
                 <a:spcPts val="4392"/>
               </a:lnSpc>
@@ -4548,7 +4750,7 @@
             </a:r>
           </a:p>
           <a:p>
-            <a:pPr algn="l" marL="777240" indent="-388620" lvl="1">
+            <a:pPr marL="777240" lvl="1" indent="-388620" algn="l">
               <a:lnSpc>
                 <a:spcPts val="4392"/>
               </a:lnSpc>
@@ -4569,7 +4771,7 @@
             </a:r>
           </a:p>
           <a:p>
-            <a:pPr algn="l" marL="777240" indent="-388620" lvl="1">
+            <a:pPr marL="777240" lvl="1" indent="-388620" algn="l">
               <a:lnSpc>
                 <a:spcPts val="4392"/>
               </a:lnSpc>
@@ -4590,7 +4792,7 @@
             </a:r>
           </a:p>
           <a:p>
-            <a:pPr algn="l" marL="777240" indent="-388620" lvl="1">
+            <a:pPr marL="777240" lvl="1" indent="-388620" algn="l">
               <a:lnSpc>
                 <a:spcPts val="4392"/>
               </a:lnSpc>
@@ -4611,7 +4813,7 @@
             </a:r>
           </a:p>
           <a:p>
-            <a:pPr algn="l" marL="777240" indent="-388620" lvl="1">
+            <a:pPr marL="777240" lvl="1" indent="-388620" algn="l">
               <a:lnSpc>
                 <a:spcPts val="4392"/>
               </a:lnSpc>
@@ -4632,7 +4834,7 @@
             </a:r>
           </a:p>
           <a:p>
-            <a:pPr algn="l" marL="777240" indent="-388620" lvl="1">
+            <a:pPr marL="777240" lvl="1" indent="-388620" algn="l">
               <a:lnSpc>
                 <a:spcPts val="4392"/>
               </a:lnSpc>
@@ -4658,6 +4860,15 @@
                 <a:spcPts val="2440"/>
               </a:lnSpc>
             </a:pPr>
+            <a:endParaRPr lang="en-US" sz="3600">
+              <a:solidFill>
+                <a:srgbClr val="000000"/>
+              </a:solidFill>
+              <a:latin typeface="Libre Baskerville"/>
+              <a:ea typeface="Libre Baskerville"/>
+              <a:cs typeface="Libre Baskerville"/>
+              <a:sym typeface="Libre Baskerville"/>
+            </a:endParaRPr>
           </a:p>
         </p:txBody>
       </p:sp>
@@ -4670,13 +4881,14 @@
 </file>
 
 <file path=ppt/slides/slide2.xml><?xml version="1.0" encoding="utf-8"?>
-<p:sld xmlns:p="http://schemas.openxmlformats.org/presentationml/2006/main" xmlns:a="http://schemas.openxmlformats.org/drawingml/2006/main">
+<p:sld xmlns:a="http://schemas.openxmlformats.org/drawingml/2006/main" xmlns:r="http://schemas.openxmlformats.org/officeDocument/2006/relationships" xmlns:p="http://schemas.openxmlformats.org/presentationml/2006/main">
   <p:cSld>
     <p:bg>
       <p:bgPr>
         <a:solidFill>
           <a:srgbClr val="F4F4F4"/>
         </a:solidFill>
+        <a:effectLst/>
       </p:bgPr>
     </p:bg>
     <p:spTree>
@@ -4695,12 +4907,12 @@
       </p:grpSpPr>
       <p:sp>
         <p:nvSpPr>
-          <p:cNvPr name="TextBox 2" id="2"/>
-          <p:cNvSpPr txBox="true"/>
+          <p:cNvPr id="2" name="TextBox 2"/>
+          <p:cNvSpPr txBox="1"/>
           <p:nvPr/>
         </p:nvSpPr>
         <p:spPr>
-          <a:xfrm rot="0">
+          <a:xfrm>
             <a:off x="3568735" y="2768640"/>
             <a:ext cx="4275272" cy="356108"/>
           </a:xfrm>
@@ -4709,7 +4921,7 @@
           </a:prstGeom>
         </p:spPr>
         <p:txBody>
-          <a:bodyPr anchor="t" rtlCol="false" tIns="0" lIns="0" bIns="0" rIns="0">
+          <a:bodyPr lIns="0" tIns="0" rIns="0" bIns="0" rtlCol="0" anchor="t">
             <a:spAutoFit/>
           </a:bodyPr>
           <a:lstStyle/>
@@ -4739,12 +4951,12 @@
       </p:sp>
       <p:grpSp>
         <p:nvGrpSpPr>
-          <p:cNvPr name="Group 3" id="3"/>
+          <p:cNvPr id="3" name="Group 3"/>
           <p:cNvGrpSpPr/>
           <p:nvPr/>
         </p:nvGrpSpPr>
         <p:grpSpPr>
-          <a:xfrm rot="0">
+          <a:xfrm>
             <a:off x="2234239" y="2508111"/>
             <a:ext cx="886691" cy="886691"/>
             <a:chOff x="0" y="0"/>
@@ -4753,12 +4965,12 @@
         </p:grpSpPr>
         <p:sp>
           <p:nvSpPr>
-            <p:cNvPr name="Freeform 4" id="4"/>
+            <p:cNvPr id="4" name="Freeform 4"/>
             <p:cNvSpPr/>
             <p:nvPr/>
           </p:nvSpPr>
           <p:spPr>
-            <a:xfrm flipH="false" flipV="false" rot="0">
+            <a:xfrm>
               <a:off x="0" y="0"/>
               <a:ext cx="812800" cy="812800"/>
             </a:xfrm>
@@ -4767,9 +4979,9 @@
               <a:gdLst/>
               <a:ahLst/>
               <a:cxnLst/>
-              <a:rect r="r" b="b" t="t" l="l"/>
+              <a:rect l="l" t="t" r="r" b="b"/>
               <a:pathLst>
-                <a:path h="812800" w="812800">
+                <a:path w="812800" h="812800">
                   <a:moveTo>
                     <a:pt x="406400" y="0"/>
                   </a:moveTo>
@@ -4810,11 +5022,18 @@
               <a:miter/>
             </a:ln>
           </p:spPr>
+          <p:txBody>
+            <a:bodyPr/>
+            <a:lstStyle/>
+            <a:p>
+              <a:endParaRPr lang="en-IN"/>
+            </a:p>
+          </p:txBody>
         </p:sp>
         <p:sp>
           <p:nvSpPr>
-            <p:cNvPr name="TextBox 5" id="5"/>
-            <p:cNvSpPr txBox="true"/>
+            <p:cNvPr id="5" name="TextBox 5"/>
+            <p:cNvSpPr txBox="1"/>
             <p:nvPr/>
           </p:nvSpPr>
           <p:spPr>
@@ -4827,7 +5046,7 @@
             </a:prstGeom>
           </p:spPr>
           <p:txBody>
-            <a:bodyPr anchor="ctr" rtlCol="false" tIns="39682" lIns="39682" bIns="39682" rIns="39682"/>
+            <a:bodyPr lIns="39682" tIns="39682" rIns="39682" bIns="39682" rtlCol="0" anchor="ctr"/>
             <a:lstStyle/>
             <a:p>
               <a:pPr algn="ctr">
@@ -4835,18 +5054,19 @@
                   <a:spcPts val="2123"/>
                 </a:lnSpc>
               </a:pPr>
+              <a:endParaRPr/>
             </a:p>
           </p:txBody>
         </p:sp>
       </p:grpSp>
       <p:sp>
         <p:nvSpPr>
-          <p:cNvPr name="TextBox 6" id="6"/>
-          <p:cNvSpPr txBox="true"/>
+          <p:cNvPr id="6" name="TextBox 6"/>
+          <p:cNvSpPr txBox="1"/>
           <p:nvPr/>
         </p:nvSpPr>
         <p:spPr>
-          <a:xfrm rot="0">
+          <a:xfrm>
             <a:off x="2308711" y="2616923"/>
             <a:ext cx="737747" cy="602391"/>
           </a:xfrm>
@@ -4855,7 +5075,7 @@
           </a:prstGeom>
         </p:spPr>
         <p:txBody>
-          <a:bodyPr anchor="t" rtlCol="false" tIns="0" lIns="0" bIns="0" rIns="0">
+          <a:bodyPr lIns="0" tIns="0" rIns="0" bIns="0" rtlCol="0" anchor="t">
             <a:spAutoFit/>
           </a:bodyPr>
           <a:lstStyle/>
@@ -4884,12 +5104,12 @@
       </p:sp>
       <p:grpSp>
         <p:nvGrpSpPr>
-          <p:cNvPr name="Group 7" id="7"/>
+          <p:cNvPr id="7" name="Group 7"/>
           <p:cNvGrpSpPr/>
           <p:nvPr/>
         </p:nvGrpSpPr>
         <p:grpSpPr>
-          <a:xfrm rot="0">
+          <a:xfrm>
             <a:off x="2234239" y="8478600"/>
             <a:ext cx="886691" cy="886691"/>
             <a:chOff x="0" y="0"/>
@@ -4898,12 +5118,12 @@
         </p:grpSpPr>
         <p:sp>
           <p:nvSpPr>
-            <p:cNvPr name="Freeform 8" id="8"/>
+            <p:cNvPr id="8" name="Freeform 8"/>
             <p:cNvSpPr/>
             <p:nvPr/>
           </p:nvSpPr>
           <p:spPr>
-            <a:xfrm flipH="false" flipV="false" rot="0">
+            <a:xfrm>
               <a:off x="0" y="0"/>
               <a:ext cx="812800" cy="812800"/>
             </a:xfrm>
@@ -4912,9 +5132,9 @@
               <a:gdLst/>
               <a:ahLst/>
               <a:cxnLst/>
-              <a:rect r="r" b="b" t="t" l="l"/>
+              <a:rect l="l" t="t" r="r" b="b"/>
               <a:pathLst>
-                <a:path h="812800" w="812800">
+                <a:path w="812800" h="812800">
                   <a:moveTo>
                     <a:pt x="406400" y="0"/>
                   </a:moveTo>
@@ -4955,11 +5175,18 @@
               <a:miter/>
             </a:ln>
           </p:spPr>
+          <p:txBody>
+            <a:bodyPr/>
+            <a:lstStyle/>
+            <a:p>
+              <a:endParaRPr lang="en-IN"/>
+            </a:p>
+          </p:txBody>
         </p:sp>
         <p:sp>
           <p:nvSpPr>
-            <p:cNvPr name="TextBox 9" id="9"/>
-            <p:cNvSpPr txBox="true"/>
+            <p:cNvPr id="9" name="TextBox 9"/>
+            <p:cNvSpPr txBox="1"/>
             <p:nvPr/>
           </p:nvSpPr>
           <p:spPr>
@@ -4972,7 +5199,7 @@
             </a:prstGeom>
           </p:spPr>
           <p:txBody>
-            <a:bodyPr anchor="ctr" rtlCol="false" tIns="39682" lIns="39682" bIns="39682" rIns="39682"/>
+            <a:bodyPr lIns="39682" tIns="39682" rIns="39682" bIns="39682" rtlCol="0" anchor="ctr"/>
             <a:lstStyle/>
             <a:p>
               <a:pPr algn="ctr">
@@ -4980,18 +5207,19 @@
                   <a:spcPts val="2123"/>
                 </a:lnSpc>
               </a:pPr>
+              <a:endParaRPr/>
             </a:p>
           </p:txBody>
         </p:sp>
       </p:grpSp>
       <p:sp>
         <p:nvSpPr>
-          <p:cNvPr name="TextBox 10" id="10"/>
-          <p:cNvSpPr txBox="true"/>
+          <p:cNvPr id="10" name="TextBox 10"/>
+          <p:cNvSpPr txBox="1"/>
           <p:nvPr/>
         </p:nvSpPr>
         <p:spPr>
-          <a:xfrm rot="0">
+          <a:xfrm>
             <a:off x="2308711" y="8587412"/>
             <a:ext cx="737747" cy="602391"/>
           </a:xfrm>
@@ -5000,7 +5228,7 @@
           </a:prstGeom>
         </p:spPr>
         <p:txBody>
-          <a:bodyPr anchor="t" rtlCol="false" tIns="0" lIns="0" bIns="0" rIns="0">
+          <a:bodyPr lIns="0" tIns="0" rIns="0" bIns="0" rtlCol="0" anchor="t">
             <a:spAutoFit/>
           </a:bodyPr>
           <a:lstStyle/>
@@ -5029,12 +5257,12 @@
       </p:sp>
       <p:grpSp>
         <p:nvGrpSpPr>
-          <p:cNvPr name="Group 11" id="11"/>
+          <p:cNvPr id="11" name="Group 11"/>
           <p:cNvGrpSpPr/>
           <p:nvPr/>
         </p:nvGrpSpPr>
         <p:grpSpPr>
-          <a:xfrm rot="0">
+          <a:xfrm>
             <a:off x="2234239" y="3975827"/>
             <a:ext cx="886691" cy="886691"/>
             <a:chOff x="0" y="0"/>
@@ -5043,12 +5271,12 @@
         </p:grpSpPr>
         <p:sp>
           <p:nvSpPr>
-            <p:cNvPr name="Freeform 12" id="12"/>
+            <p:cNvPr id="12" name="Freeform 12"/>
             <p:cNvSpPr/>
             <p:nvPr/>
           </p:nvSpPr>
           <p:spPr>
-            <a:xfrm flipH="false" flipV="false" rot="0">
+            <a:xfrm>
               <a:off x="0" y="0"/>
               <a:ext cx="812800" cy="812800"/>
             </a:xfrm>
@@ -5057,9 +5285,9 @@
               <a:gdLst/>
               <a:ahLst/>
               <a:cxnLst/>
-              <a:rect r="r" b="b" t="t" l="l"/>
+              <a:rect l="l" t="t" r="r" b="b"/>
               <a:pathLst>
-                <a:path h="812800" w="812800">
+                <a:path w="812800" h="812800">
                   <a:moveTo>
                     <a:pt x="406400" y="0"/>
                   </a:moveTo>
@@ -5100,11 +5328,18 @@
               <a:miter/>
             </a:ln>
           </p:spPr>
+          <p:txBody>
+            <a:bodyPr/>
+            <a:lstStyle/>
+            <a:p>
+              <a:endParaRPr lang="en-IN"/>
+            </a:p>
+          </p:txBody>
         </p:sp>
         <p:sp>
           <p:nvSpPr>
-            <p:cNvPr name="TextBox 13" id="13"/>
-            <p:cNvSpPr txBox="true"/>
+            <p:cNvPr id="13" name="TextBox 13"/>
+            <p:cNvSpPr txBox="1"/>
             <p:nvPr/>
           </p:nvSpPr>
           <p:spPr>
@@ -5117,7 +5352,7 @@
             </a:prstGeom>
           </p:spPr>
           <p:txBody>
-            <a:bodyPr anchor="ctr" rtlCol="false" tIns="50800" lIns="50800" bIns="50800" rIns="50800"/>
+            <a:bodyPr lIns="50800" tIns="50800" rIns="50800" bIns="50800" rtlCol="0" anchor="ctr"/>
             <a:lstStyle/>
             <a:p>
               <a:pPr algn="ctr">
@@ -5125,18 +5360,19 @@
                   <a:spcPts val="2123"/>
                 </a:lnSpc>
               </a:pPr>
+              <a:endParaRPr/>
             </a:p>
           </p:txBody>
         </p:sp>
       </p:grpSp>
       <p:sp>
         <p:nvSpPr>
-          <p:cNvPr name="TextBox 14" id="14"/>
-          <p:cNvSpPr txBox="true"/>
+          <p:cNvPr id="14" name="TextBox 14"/>
+          <p:cNvSpPr txBox="1"/>
           <p:nvPr/>
         </p:nvSpPr>
         <p:spPr>
-          <a:xfrm rot="0">
+          <a:xfrm>
             <a:off x="2234239" y="4084740"/>
             <a:ext cx="886691" cy="602189"/>
           </a:xfrm>
@@ -5145,7 +5381,7 @@
           </a:prstGeom>
         </p:spPr>
         <p:txBody>
-          <a:bodyPr anchor="t" rtlCol="false" tIns="0" lIns="0" bIns="0" rIns="0">
+          <a:bodyPr lIns="0" tIns="0" rIns="0" bIns="0" rtlCol="0" anchor="t">
             <a:spAutoFit/>
           </a:bodyPr>
           <a:lstStyle/>
@@ -5172,12 +5408,12 @@
       </p:sp>
       <p:grpSp>
         <p:nvGrpSpPr>
-          <p:cNvPr name="Group 15" id="15"/>
+          <p:cNvPr id="15" name="Group 15"/>
           <p:cNvGrpSpPr/>
           <p:nvPr/>
         </p:nvGrpSpPr>
         <p:grpSpPr>
-          <a:xfrm rot="0">
+          <a:xfrm>
             <a:off x="2234239" y="5442849"/>
             <a:ext cx="876404" cy="876404"/>
             <a:chOff x="0" y="0"/>
@@ -5186,12 +5422,12 @@
         </p:grpSpPr>
         <p:sp>
           <p:nvSpPr>
-            <p:cNvPr name="Freeform 16" id="16"/>
+            <p:cNvPr id="16" name="Freeform 16"/>
             <p:cNvSpPr/>
             <p:nvPr/>
           </p:nvSpPr>
           <p:spPr>
-            <a:xfrm flipH="false" flipV="false" rot="0">
+            <a:xfrm>
               <a:off x="0" y="0"/>
               <a:ext cx="812800" cy="812800"/>
             </a:xfrm>
@@ -5200,9 +5436,9 @@
               <a:gdLst/>
               <a:ahLst/>
               <a:cxnLst/>
-              <a:rect r="r" b="b" t="t" l="l"/>
+              <a:rect l="l" t="t" r="r" b="b"/>
               <a:pathLst>
-                <a:path h="812800" w="812800">
+                <a:path w="812800" h="812800">
                   <a:moveTo>
                     <a:pt x="406400" y="0"/>
                   </a:moveTo>
@@ -5243,11 +5479,18 @@
               <a:miter/>
             </a:ln>
           </p:spPr>
+          <p:txBody>
+            <a:bodyPr/>
+            <a:lstStyle/>
+            <a:p>
+              <a:endParaRPr lang="en-IN"/>
+            </a:p>
+          </p:txBody>
         </p:sp>
         <p:sp>
           <p:nvSpPr>
-            <p:cNvPr name="TextBox 17" id="17"/>
-            <p:cNvSpPr txBox="true"/>
+            <p:cNvPr id="17" name="TextBox 17"/>
+            <p:cNvSpPr txBox="1"/>
             <p:nvPr/>
           </p:nvSpPr>
           <p:spPr>
@@ -5260,7 +5503,7 @@
             </a:prstGeom>
           </p:spPr>
           <p:txBody>
-            <a:bodyPr anchor="ctr" rtlCol="false" tIns="50800" lIns="50800" bIns="50800" rIns="50800"/>
+            <a:bodyPr lIns="50800" tIns="50800" rIns="50800" bIns="50800" rtlCol="0" anchor="ctr"/>
             <a:lstStyle/>
             <a:p>
               <a:pPr algn="ctr">
@@ -5268,18 +5511,19 @@
                   <a:spcPts val="2123"/>
                 </a:lnSpc>
               </a:pPr>
+              <a:endParaRPr/>
             </a:p>
           </p:txBody>
         </p:sp>
       </p:grpSp>
       <p:sp>
         <p:nvSpPr>
-          <p:cNvPr name="TextBox 18" id="18"/>
-          <p:cNvSpPr txBox="true"/>
+          <p:cNvPr id="18" name="TextBox 18"/>
+          <p:cNvSpPr txBox="1"/>
           <p:nvPr/>
         </p:nvSpPr>
         <p:spPr>
-          <a:xfrm rot="0">
+          <a:xfrm>
             <a:off x="2234239" y="5559250"/>
             <a:ext cx="876404" cy="586451"/>
           </a:xfrm>
@@ -5288,7 +5532,7 @@
           </a:prstGeom>
         </p:spPr>
         <p:txBody>
-          <a:bodyPr anchor="t" rtlCol="false" tIns="0" lIns="0" bIns="0" rIns="0">
+          <a:bodyPr lIns="0" tIns="0" rIns="0" bIns="0" rtlCol="0" anchor="t">
             <a:spAutoFit/>
           </a:bodyPr>
           <a:lstStyle/>
@@ -5315,12 +5559,12 @@
       </p:sp>
       <p:grpSp>
         <p:nvGrpSpPr>
-          <p:cNvPr name="Group 19" id="19"/>
+          <p:cNvPr id="19" name="Group 19"/>
           <p:cNvGrpSpPr/>
           <p:nvPr/>
         </p:nvGrpSpPr>
         <p:grpSpPr>
-          <a:xfrm rot="0">
+          <a:xfrm>
             <a:off x="2234239" y="6954728"/>
             <a:ext cx="876404" cy="876404"/>
             <a:chOff x="0" y="0"/>
@@ -5329,12 +5573,12 @@
         </p:grpSpPr>
         <p:sp>
           <p:nvSpPr>
-            <p:cNvPr name="Freeform 20" id="20"/>
+            <p:cNvPr id="20" name="Freeform 20"/>
             <p:cNvSpPr/>
             <p:nvPr/>
           </p:nvSpPr>
           <p:spPr>
-            <a:xfrm flipH="false" flipV="false" rot="0">
+            <a:xfrm>
               <a:off x="0" y="0"/>
               <a:ext cx="812800" cy="812800"/>
             </a:xfrm>
@@ -5343,9 +5587,9 @@
               <a:gdLst/>
               <a:ahLst/>
               <a:cxnLst/>
-              <a:rect r="r" b="b" t="t" l="l"/>
+              <a:rect l="l" t="t" r="r" b="b"/>
               <a:pathLst>
-                <a:path h="812800" w="812800">
+                <a:path w="812800" h="812800">
                   <a:moveTo>
                     <a:pt x="406400" y="0"/>
                   </a:moveTo>
@@ -5386,11 +5630,18 @@
               <a:miter/>
             </a:ln>
           </p:spPr>
+          <p:txBody>
+            <a:bodyPr/>
+            <a:lstStyle/>
+            <a:p>
+              <a:endParaRPr lang="en-IN"/>
+            </a:p>
+          </p:txBody>
         </p:sp>
         <p:sp>
           <p:nvSpPr>
-            <p:cNvPr name="TextBox 21" id="21"/>
-            <p:cNvSpPr txBox="true"/>
+            <p:cNvPr id="21" name="TextBox 21"/>
+            <p:cNvSpPr txBox="1"/>
             <p:nvPr/>
           </p:nvSpPr>
           <p:spPr>
@@ -5403,7 +5654,7 @@
             </a:prstGeom>
           </p:spPr>
           <p:txBody>
-            <a:bodyPr anchor="ctr" rtlCol="false" tIns="50800" lIns="50800" bIns="50800" rIns="50800"/>
+            <a:bodyPr lIns="50800" tIns="50800" rIns="50800" bIns="50800" rtlCol="0" anchor="ctr"/>
             <a:lstStyle/>
             <a:p>
               <a:pPr algn="ctr">
@@ -5411,18 +5662,19 @@
                   <a:spcPts val="2123"/>
                 </a:lnSpc>
               </a:pPr>
+              <a:endParaRPr/>
             </a:p>
           </p:txBody>
         </p:sp>
       </p:grpSp>
       <p:sp>
         <p:nvSpPr>
-          <p:cNvPr name="TextBox 22" id="22"/>
-          <p:cNvSpPr txBox="true"/>
+          <p:cNvPr id="22" name="TextBox 22"/>
+          <p:cNvSpPr txBox="1"/>
           <p:nvPr/>
         </p:nvSpPr>
         <p:spPr>
-          <a:xfrm rot="0">
+          <a:xfrm>
             <a:off x="2234239" y="7071129"/>
             <a:ext cx="876404" cy="586451"/>
           </a:xfrm>
@@ -5431,7 +5683,7 @@
           </a:prstGeom>
         </p:spPr>
         <p:txBody>
-          <a:bodyPr anchor="t" rtlCol="false" tIns="0" lIns="0" bIns="0" rIns="0">
+          <a:bodyPr lIns="0" tIns="0" rIns="0" bIns="0" rtlCol="0" anchor="t">
             <a:spAutoFit/>
           </a:bodyPr>
           <a:lstStyle/>
@@ -5458,12 +5710,12 @@
       </p:sp>
       <p:sp>
         <p:nvSpPr>
-          <p:cNvPr name="TextBox 23" id="23"/>
-          <p:cNvSpPr txBox="true"/>
+          <p:cNvPr id="23" name="TextBox 23"/>
+          <p:cNvSpPr txBox="1"/>
           <p:nvPr/>
         </p:nvSpPr>
         <p:spPr>
-          <a:xfrm rot="0">
+          <a:xfrm>
             <a:off x="3568735" y="4236356"/>
             <a:ext cx="4275272" cy="356108"/>
           </a:xfrm>
@@ -5472,7 +5724,7 @@
           </a:prstGeom>
         </p:spPr>
         <p:txBody>
-          <a:bodyPr anchor="t" rtlCol="false" tIns="0" lIns="0" bIns="0" rIns="0">
+          <a:bodyPr lIns="0" tIns="0" rIns="0" bIns="0" rtlCol="0" anchor="t">
             <a:spAutoFit/>
           </a:bodyPr>
           <a:lstStyle/>
@@ -5502,12 +5754,12 @@
       </p:sp>
       <p:sp>
         <p:nvSpPr>
-          <p:cNvPr name="TextBox 24" id="24"/>
-          <p:cNvSpPr txBox="true"/>
+          <p:cNvPr id="24" name="TextBox 24"/>
+          <p:cNvSpPr txBox="1"/>
           <p:nvPr/>
         </p:nvSpPr>
         <p:spPr>
-          <a:xfrm rot="0">
+          <a:xfrm>
             <a:off x="3568735" y="5551225"/>
             <a:ext cx="4275272" cy="708533"/>
           </a:xfrm>
@@ -5516,7 +5768,7 @@
           </a:prstGeom>
         </p:spPr>
         <p:txBody>
-          <a:bodyPr anchor="t" rtlCol="false" tIns="0" lIns="0" bIns="0" rIns="0">
+          <a:bodyPr lIns="0" tIns="0" rIns="0" bIns="0" rtlCol="0" anchor="t">
             <a:spAutoFit/>
           </a:bodyPr>
           <a:lstStyle/>
@@ -5546,12 +5798,12 @@
       </p:sp>
       <p:sp>
         <p:nvSpPr>
-          <p:cNvPr name="TextBox 25" id="25"/>
-          <p:cNvSpPr txBox="true"/>
+          <p:cNvPr id="25" name="TextBox 25"/>
+          <p:cNvSpPr txBox="1"/>
           <p:nvPr/>
         </p:nvSpPr>
         <p:spPr>
-          <a:xfrm rot="0">
+          <a:xfrm>
             <a:off x="3568735" y="7210113"/>
             <a:ext cx="4275272" cy="356108"/>
           </a:xfrm>
@@ -5560,7 +5812,7 @@
           </a:prstGeom>
         </p:spPr>
         <p:txBody>
-          <a:bodyPr anchor="t" rtlCol="false" tIns="0" lIns="0" bIns="0" rIns="0">
+          <a:bodyPr lIns="0" tIns="0" rIns="0" bIns="0" rtlCol="0" anchor="t">
             <a:spAutoFit/>
           </a:bodyPr>
           <a:lstStyle/>
@@ -5590,12 +5842,12 @@
       </p:sp>
       <p:sp>
         <p:nvSpPr>
-          <p:cNvPr name="TextBox 26" id="26"/>
-          <p:cNvSpPr txBox="true"/>
+          <p:cNvPr id="26" name="TextBox 26"/>
+          <p:cNvSpPr txBox="1"/>
           <p:nvPr/>
         </p:nvSpPr>
         <p:spPr>
-          <a:xfrm rot="0">
+          <a:xfrm>
             <a:off x="3568735" y="8739129"/>
             <a:ext cx="4275272" cy="356108"/>
           </a:xfrm>
@@ -5604,7 +5856,7 @@
           </a:prstGeom>
         </p:spPr>
         <p:txBody>
-          <a:bodyPr anchor="t" rtlCol="false" tIns="0" lIns="0" bIns="0" rIns="0">
+          <a:bodyPr lIns="0" tIns="0" rIns="0" bIns="0" rtlCol="0" anchor="t">
             <a:spAutoFit/>
           </a:bodyPr>
           <a:lstStyle/>
@@ -5634,12 +5886,12 @@
       </p:sp>
       <p:sp>
         <p:nvSpPr>
-          <p:cNvPr name="TextBox 27" id="27"/>
-          <p:cNvSpPr txBox="true"/>
+          <p:cNvPr id="27" name="TextBox 27"/>
+          <p:cNvSpPr txBox="1"/>
           <p:nvPr/>
         </p:nvSpPr>
         <p:spPr>
-          <a:xfrm rot="0">
+          <a:xfrm>
             <a:off x="12984028" y="2768640"/>
             <a:ext cx="4275272" cy="356108"/>
           </a:xfrm>
@@ -5648,7 +5900,7 @@
           </a:prstGeom>
         </p:spPr>
         <p:txBody>
-          <a:bodyPr anchor="t" rtlCol="false" tIns="0" lIns="0" bIns="0" rIns="0">
+          <a:bodyPr lIns="0" tIns="0" rIns="0" bIns="0" rtlCol="0" anchor="t">
             <a:spAutoFit/>
           </a:bodyPr>
           <a:lstStyle/>
@@ -5678,12 +5930,12 @@
       </p:sp>
       <p:grpSp>
         <p:nvGrpSpPr>
-          <p:cNvPr name="Group 28" id="28"/>
+          <p:cNvPr id="28" name="Group 28"/>
           <p:cNvGrpSpPr/>
           <p:nvPr/>
         </p:nvGrpSpPr>
         <p:grpSpPr>
-          <a:xfrm rot="0">
+          <a:xfrm>
             <a:off x="11649532" y="2508111"/>
             <a:ext cx="886691" cy="886691"/>
             <a:chOff x="0" y="0"/>
@@ -5692,12 +5944,12 @@
         </p:grpSpPr>
         <p:sp>
           <p:nvSpPr>
-            <p:cNvPr name="Freeform 29" id="29"/>
+            <p:cNvPr id="29" name="Freeform 29"/>
             <p:cNvSpPr/>
             <p:nvPr/>
           </p:nvSpPr>
           <p:spPr>
-            <a:xfrm flipH="false" flipV="false" rot="0">
+            <a:xfrm>
               <a:off x="0" y="0"/>
               <a:ext cx="812800" cy="812800"/>
             </a:xfrm>
@@ -5706,9 +5958,9 @@
               <a:gdLst/>
               <a:ahLst/>
               <a:cxnLst/>
-              <a:rect r="r" b="b" t="t" l="l"/>
+              <a:rect l="l" t="t" r="r" b="b"/>
               <a:pathLst>
-                <a:path h="812800" w="812800">
+                <a:path w="812800" h="812800">
                   <a:moveTo>
                     <a:pt x="406400" y="0"/>
                   </a:moveTo>
@@ -5749,11 +6001,18 @@
               <a:miter/>
             </a:ln>
           </p:spPr>
+          <p:txBody>
+            <a:bodyPr/>
+            <a:lstStyle/>
+            <a:p>
+              <a:endParaRPr lang="en-IN"/>
+            </a:p>
+          </p:txBody>
         </p:sp>
         <p:sp>
           <p:nvSpPr>
-            <p:cNvPr name="TextBox 30" id="30"/>
-            <p:cNvSpPr txBox="true"/>
+            <p:cNvPr id="30" name="TextBox 30"/>
+            <p:cNvSpPr txBox="1"/>
             <p:nvPr/>
           </p:nvSpPr>
           <p:spPr>
@@ -5766,7 +6025,7 @@
             </a:prstGeom>
           </p:spPr>
           <p:txBody>
-            <a:bodyPr anchor="ctr" rtlCol="false" tIns="39682" lIns="39682" bIns="39682" rIns="39682"/>
+            <a:bodyPr lIns="39682" tIns="39682" rIns="39682" bIns="39682" rtlCol="0" anchor="ctr"/>
             <a:lstStyle/>
             <a:p>
               <a:pPr algn="ctr">
@@ -5774,18 +6033,19 @@
                   <a:spcPts val="2123"/>
                 </a:lnSpc>
               </a:pPr>
+              <a:endParaRPr/>
             </a:p>
           </p:txBody>
         </p:sp>
       </p:grpSp>
       <p:sp>
         <p:nvSpPr>
-          <p:cNvPr name="TextBox 31" id="31"/>
-          <p:cNvSpPr txBox="true"/>
+          <p:cNvPr id="31" name="TextBox 31"/>
+          <p:cNvSpPr txBox="1"/>
           <p:nvPr/>
         </p:nvSpPr>
         <p:spPr>
-          <a:xfrm rot="0">
+          <a:xfrm>
             <a:off x="11724004" y="2616923"/>
             <a:ext cx="737747" cy="602391"/>
           </a:xfrm>
@@ -5794,7 +6054,7 @@
           </a:prstGeom>
         </p:spPr>
         <p:txBody>
-          <a:bodyPr anchor="t" rtlCol="false" tIns="0" lIns="0" bIns="0" rIns="0">
+          <a:bodyPr lIns="0" tIns="0" rIns="0" bIns="0" rtlCol="0" anchor="t">
             <a:spAutoFit/>
           </a:bodyPr>
           <a:lstStyle/>
@@ -5823,12 +6083,12 @@
       </p:sp>
       <p:grpSp>
         <p:nvGrpSpPr>
-          <p:cNvPr name="Group 32" id="32"/>
+          <p:cNvPr id="32" name="Group 32"/>
           <p:cNvGrpSpPr/>
           <p:nvPr/>
         </p:nvGrpSpPr>
         <p:grpSpPr>
-          <a:xfrm rot="0">
+          <a:xfrm>
             <a:off x="11649532" y="8478600"/>
             <a:ext cx="886691" cy="886691"/>
             <a:chOff x="0" y="0"/>
@@ -5837,12 +6097,12 @@
         </p:grpSpPr>
         <p:sp>
           <p:nvSpPr>
-            <p:cNvPr name="Freeform 33" id="33"/>
+            <p:cNvPr id="33" name="Freeform 33"/>
             <p:cNvSpPr/>
             <p:nvPr/>
           </p:nvSpPr>
           <p:spPr>
-            <a:xfrm flipH="false" flipV="false" rot="0">
+            <a:xfrm>
               <a:off x="0" y="0"/>
               <a:ext cx="812800" cy="812800"/>
             </a:xfrm>
@@ -5851,9 +6111,9 @@
               <a:gdLst/>
               <a:ahLst/>
               <a:cxnLst/>
-              <a:rect r="r" b="b" t="t" l="l"/>
+              <a:rect l="l" t="t" r="r" b="b"/>
               <a:pathLst>
-                <a:path h="812800" w="812800">
+                <a:path w="812800" h="812800">
                   <a:moveTo>
                     <a:pt x="406400" y="0"/>
                   </a:moveTo>
@@ -5894,11 +6154,18 @@
               <a:miter/>
             </a:ln>
           </p:spPr>
+          <p:txBody>
+            <a:bodyPr/>
+            <a:lstStyle/>
+            <a:p>
+              <a:endParaRPr lang="en-IN"/>
+            </a:p>
+          </p:txBody>
         </p:sp>
         <p:sp>
           <p:nvSpPr>
-            <p:cNvPr name="TextBox 34" id="34"/>
-            <p:cNvSpPr txBox="true"/>
+            <p:cNvPr id="34" name="TextBox 34"/>
+            <p:cNvSpPr txBox="1"/>
             <p:nvPr/>
           </p:nvSpPr>
           <p:spPr>
@@ -5911,7 +6178,7 @@
             </a:prstGeom>
           </p:spPr>
           <p:txBody>
-            <a:bodyPr anchor="ctr" rtlCol="false" tIns="39682" lIns="39682" bIns="39682" rIns="39682"/>
+            <a:bodyPr lIns="39682" tIns="39682" rIns="39682" bIns="39682" rtlCol="0" anchor="ctr"/>
             <a:lstStyle/>
             <a:p>
               <a:pPr algn="ctr">
@@ -5919,18 +6186,19 @@
                   <a:spcPts val="2123"/>
                 </a:lnSpc>
               </a:pPr>
+              <a:endParaRPr/>
             </a:p>
           </p:txBody>
         </p:sp>
       </p:grpSp>
       <p:sp>
         <p:nvSpPr>
-          <p:cNvPr name="TextBox 35" id="35"/>
-          <p:cNvSpPr txBox="true"/>
+          <p:cNvPr id="35" name="TextBox 35"/>
+          <p:cNvSpPr txBox="1"/>
           <p:nvPr/>
         </p:nvSpPr>
         <p:spPr>
-          <a:xfrm rot="0">
+          <a:xfrm>
             <a:off x="11724004" y="8587412"/>
             <a:ext cx="737747" cy="602391"/>
           </a:xfrm>
@@ -5939,7 +6207,7 @@
           </a:prstGeom>
         </p:spPr>
         <p:txBody>
-          <a:bodyPr anchor="t" rtlCol="false" tIns="0" lIns="0" bIns="0" rIns="0">
+          <a:bodyPr lIns="0" tIns="0" rIns="0" bIns="0" rtlCol="0" anchor="t">
             <a:spAutoFit/>
           </a:bodyPr>
           <a:lstStyle/>
@@ -5968,12 +6236,12 @@
       </p:sp>
       <p:grpSp>
         <p:nvGrpSpPr>
-          <p:cNvPr name="Group 36" id="36"/>
+          <p:cNvPr id="36" name="Group 36"/>
           <p:cNvGrpSpPr/>
           <p:nvPr/>
         </p:nvGrpSpPr>
         <p:grpSpPr>
-          <a:xfrm rot="0">
+          <a:xfrm>
             <a:off x="11649532" y="3975827"/>
             <a:ext cx="886691" cy="886691"/>
             <a:chOff x="0" y="0"/>
@@ -5982,12 +6250,12 @@
         </p:grpSpPr>
         <p:sp>
           <p:nvSpPr>
-            <p:cNvPr name="Freeform 37" id="37"/>
+            <p:cNvPr id="37" name="Freeform 37"/>
             <p:cNvSpPr/>
             <p:nvPr/>
           </p:nvSpPr>
           <p:spPr>
-            <a:xfrm flipH="false" flipV="false" rot="0">
+            <a:xfrm>
               <a:off x="0" y="0"/>
               <a:ext cx="812800" cy="812800"/>
             </a:xfrm>
@@ -5996,9 +6264,9 @@
               <a:gdLst/>
               <a:ahLst/>
               <a:cxnLst/>
-              <a:rect r="r" b="b" t="t" l="l"/>
+              <a:rect l="l" t="t" r="r" b="b"/>
               <a:pathLst>
-                <a:path h="812800" w="812800">
+                <a:path w="812800" h="812800">
                   <a:moveTo>
                     <a:pt x="406400" y="0"/>
                   </a:moveTo>
@@ -6039,11 +6307,18 @@
               <a:miter/>
             </a:ln>
           </p:spPr>
+          <p:txBody>
+            <a:bodyPr/>
+            <a:lstStyle/>
+            <a:p>
+              <a:endParaRPr lang="en-IN"/>
+            </a:p>
+          </p:txBody>
         </p:sp>
         <p:sp>
           <p:nvSpPr>
-            <p:cNvPr name="TextBox 38" id="38"/>
-            <p:cNvSpPr txBox="true"/>
+            <p:cNvPr id="38" name="TextBox 38"/>
+            <p:cNvSpPr txBox="1"/>
             <p:nvPr/>
           </p:nvSpPr>
           <p:spPr>
@@ -6056,7 +6331,7 @@
             </a:prstGeom>
           </p:spPr>
           <p:txBody>
-            <a:bodyPr anchor="ctr" rtlCol="false" tIns="50800" lIns="50800" bIns="50800" rIns="50800"/>
+            <a:bodyPr lIns="50800" tIns="50800" rIns="50800" bIns="50800" rtlCol="0" anchor="ctr"/>
             <a:lstStyle/>
             <a:p>
               <a:pPr algn="ctr">
@@ -6064,18 +6339,19 @@
                   <a:spcPts val="2123"/>
                 </a:lnSpc>
               </a:pPr>
+              <a:endParaRPr/>
             </a:p>
           </p:txBody>
         </p:sp>
       </p:grpSp>
       <p:sp>
         <p:nvSpPr>
-          <p:cNvPr name="TextBox 39" id="39"/>
-          <p:cNvSpPr txBox="true"/>
+          <p:cNvPr id="39" name="TextBox 39"/>
+          <p:cNvSpPr txBox="1"/>
           <p:nvPr/>
         </p:nvSpPr>
         <p:spPr>
-          <a:xfrm rot="0">
+          <a:xfrm>
             <a:off x="11649532" y="4084740"/>
             <a:ext cx="886691" cy="602189"/>
           </a:xfrm>
@@ -6084,7 +6360,7 @@
           </a:prstGeom>
         </p:spPr>
         <p:txBody>
-          <a:bodyPr anchor="t" rtlCol="false" tIns="0" lIns="0" bIns="0" rIns="0">
+          <a:bodyPr lIns="0" tIns="0" rIns="0" bIns="0" rtlCol="0" anchor="t">
             <a:spAutoFit/>
           </a:bodyPr>
           <a:lstStyle/>
@@ -6111,12 +6387,12 @@
       </p:sp>
       <p:grpSp>
         <p:nvGrpSpPr>
-          <p:cNvPr name="Group 40" id="40"/>
+          <p:cNvPr id="40" name="Group 40"/>
           <p:cNvGrpSpPr/>
           <p:nvPr/>
         </p:nvGrpSpPr>
         <p:grpSpPr>
-          <a:xfrm rot="0">
+          <a:xfrm>
             <a:off x="11649532" y="5442849"/>
             <a:ext cx="876404" cy="876404"/>
             <a:chOff x="0" y="0"/>
@@ -6125,12 +6401,12 @@
         </p:grpSpPr>
         <p:sp>
           <p:nvSpPr>
-            <p:cNvPr name="Freeform 41" id="41"/>
+            <p:cNvPr id="41" name="Freeform 41"/>
             <p:cNvSpPr/>
             <p:nvPr/>
           </p:nvSpPr>
           <p:spPr>
-            <a:xfrm flipH="false" flipV="false" rot="0">
+            <a:xfrm>
               <a:off x="0" y="0"/>
               <a:ext cx="812800" cy="812800"/>
             </a:xfrm>
@@ -6139,9 +6415,9 @@
               <a:gdLst/>
               <a:ahLst/>
               <a:cxnLst/>
-              <a:rect r="r" b="b" t="t" l="l"/>
+              <a:rect l="l" t="t" r="r" b="b"/>
               <a:pathLst>
-                <a:path h="812800" w="812800">
+                <a:path w="812800" h="812800">
                   <a:moveTo>
                     <a:pt x="406400" y="0"/>
                   </a:moveTo>
@@ -6182,11 +6458,18 @@
               <a:miter/>
             </a:ln>
           </p:spPr>
+          <p:txBody>
+            <a:bodyPr/>
+            <a:lstStyle/>
+            <a:p>
+              <a:endParaRPr lang="en-IN"/>
+            </a:p>
+          </p:txBody>
         </p:sp>
         <p:sp>
           <p:nvSpPr>
-            <p:cNvPr name="TextBox 42" id="42"/>
-            <p:cNvSpPr txBox="true"/>
+            <p:cNvPr id="42" name="TextBox 42"/>
+            <p:cNvSpPr txBox="1"/>
             <p:nvPr/>
           </p:nvSpPr>
           <p:spPr>
@@ -6199,7 +6482,7 @@
             </a:prstGeom>
           </p:spPr>
           <p:txBody>
-            <a:bodyPr anchor="ctr" rtlCol="false" tIns="50800" lIns="50800" bIns="50800" rIns="50800"/>
+            <a:bodyPr lIns="50800" tIns="50800" rIns="50800" bIns="50800" rtlCol="0" anchor="ctr"/>
             <a:lstStyle/>
             <a:p>
               <a:pPr algn="ctr">
@@ -6207,18 +6490,19 @@
                   <a:spcPts val="2123"/>
                 </a:lnSpc>
               </a:pPr>
+              <a:endParaRPr/>
             </a:p>
           </p:txBody>
         </p:sp>
       </p:grpSp>
       <p:sp>
         <p:nvSpPr>
-          <p:cNvPr name="TextBox 43" id="43"/>
-          <p:cNvSpPr txBox="true"/>
+          <p:cNvPr id="43" name="TextBox 43"/>
+          <p:cNvSpPr txBox="1"/>
           <p:nvPr/>
         </p:nvSpPr>
         <p:spPr>
-          <a:xfrm rot="0">
+          <a:xfrm>
             <a:off x="11649532" y="5559250"/>
             <a:ext cx="876404" cy="586451"/>
           </a:xfrm>
@@ -6227,7 +6511,7 @@
           </a:prstGeom>
         </p:spPr>
         <p:txBody>
-          <a:bodyPr anchor="t" rtlCol="false" tIns="0" lIns="0" bIns="0" rIns="0">
+          <a:bodyPr lIns="0" tIns="0" rIns="0" bIns="0" rtlCol="0" anchor="t">
             <a:spAutoFit/>
           </a:bodyPr>
           <a:lstStyle/>
@@ -6254,12 +6538,12 @@
       </p:sp>
       <p:grpSp>
         <p:nvGrpSpPr>
-          <p:cNvPr name="Group 44" id="44"/>
+          <p:cNvPr id="44" name="Group 44"/>
           <p:cNvGrpSpPr/>
           <p:nvPr/>
         </p:nvGrpSpPr>
         <p:grpSpPr>
-          <a:xfrm rot="0">
+          <a:xfrm>
             <a:off x="11649532" y="6954728"/>
             <a:ext cx="876404" cy="876404"/>
             <a:chOff x="0" y="0"/>
@@ -6268,12 +6552,12 @@
         </p:grpSpPr>
         <p:sp>
           <p:nvSpPr>
-            <p:cNvPr name="Freeform 45" id="45"/>
+            <p:cNvPr id="45" name="Freeform 45"/>
             <p:cNvSpPr/>
             <p:nvPr/>
           </p:nvSpPr>
           <p:spPr>
-            <a:xfrm flipH="false" flipV="false" rot="0">
+            <a:xfrm>
               <a:off x="0" y="0"/>
               <a:ext cx="812800" cy="812800"/>
             </a:xfrm>
@@ -6282,9 +6566,9 @@
               <a:gdLst/>
               <a:ahLst/>
               <a:cxnLst/>
-              <a:rect r="r" b="b" t="t" l="l"/>
+              <a:rect l="l" t="t" r="r" b="b"/>
               <a:pathLst>
-                <a:path h="812800" w="812800">
+                <a:path w="812800" h="812800">
                   <a:moveTo>
                     <a:pt x="406400" y="0"/>
                   </a:moveTo>
@@ -6325,11 +6609,18 @@
               <a:miter/>
             </a:ln>
           </p:spPr>
+          <p:txBody>
+            <a:bodyPr/>
+            <a:lstStyle/>
+            <a:p>
+              <a:endParaRPr lang="en-IN"/>
+            </a:p>
+          </p:txBody>
         </p:sp>
         <p:sp>
           <p:nvSpPr>
-            <p:cNvPr name="TextBox 46" id="46"/>
-            <p:cNvSpPr txBox="true"/>
+            <p:cNvPr id="46" name="TextBox 46"/>
+            <p:cNvSpPr txBox="1"/>
             <p:nvPr/>
           </p:nvSpPr>
           <p:spPr>
@@ -6342,7 +6633,7 @@
             </a:prstGeom>
           </p:spPr>
           <p:txBody>
-            <a:bodyPr anchor="ctr" rtlCol="false" tIns="50800" lIns="50800" bIns="50800" rIns="50800"/>
+            <a:bodyPr lIns="50800" tIns="50800" rIns="50800" bIns="50800" rtlCol="0" anchor="ctr"/>
             <a:lstStyle/>
             <a:p>
               <a:pPr algn="ctr">
@@ -6350,18 +6641,19 @@
                   <a:spcPts val="2123"/>
                 </a:lnSpc>
               </a:pPr>
+              <a:endParaRPr/>
             </a:p>
           </p:txBody>
         </p:sp>
       </p:grpSp>
       <p:sp>
         <p:nvSpPr>
-          <p:cNvPr name="TextBox 47" id="47"/>
-          <p:cNvSpPr txBox="true"/>
+          <p:cNvPr id="47" name="TextBox 47"/>
+          <p:cNvSpPr txBox="1"/>
           <p:nvPr/>
         </p:nvSpPr>
         <p:spPr>
-          <a:xfrm rot="0">
+          <a:xfrm>
             <a:off x="11649532" y="7071129"/>
             <a:ext cx="876404" cy="586451"/>
           </a:xfrm>
@@ -6370,7 +6662,7 @@
           </a:prstGeom>
         </p:spPr>
         <p:txBody>
-          <a:bodyPr anchor="t" rtlCol="false" tIns="0" lIns="0" bIns="0" rIns="0">
+          <a:bodyPr lIns="0" tIns="0" rIns="0" bIns="0" rtlCol="0" anchor="t">
             <a:spAutoFit/>
           </a:bodyPr>
           <a:lstStyle/>
@@ -6397,12 +6689,12 @@
       </p:sp>
       <p:sp>
         <p:nvSpPr>
-          <p:cNvPr name="TextBox 48" id="48"/>
-          <p:cNvSpPr txBox="true"/>
+          <p:cNvPr id="48" name="TextBox 48"/>
+          <p:cNvSpPr txBox="1"/>
           <p:nvPr/>
         </p:nvSpPr>
         <p:spPr>
-          <a:xfrm rot="0">
+          <a:xfrm>
             <a:off x="12984028" y="4236356"/>
             <a:ext cx="4275272" cy="356108"/>
           </a:xfrm>
@@ -6411,7 +6703,7 @@
           </a:prstGeom>
         </p:spPr>
         <p:txBody>
-          <a:bodyPr anchor="t" rtlCol="false" tIns="0" lIns="0" bIns="0" rIns="0">
+          <a:bodyPr lIns="0" tIns="0" rIns="0" bIns="0" rtlCol="0" anchor="t">
             <a:spAutoFit/>
           </a:bodyPr>
           <a:lstStyle/>
@@ -6441,12 +6733,12 @@
       </p:sp>
       <p:sp>
         <p:nvSpPr>
-          <p:cNvPr name="TextBox 49" id="49"/>
-          <p:cNvSpPr txBox="true"/>
+          <p:cNvPr id="49" name="TextBox 49"/>
+          <p:cNvSpPr txBox="1"/>
           <p:nvPr/>
         </p:nvSpPr>
         <p:spPr>
-          <a:xfrm rot="0">
+          <a:xfrm>
             <a:off x="12984028" y="5551225"/>
             <a:ext cx="4275272" cy="708533"/>
           </a:xfrm>
@@ -6455,7 +6747,7 @@
           </a:prstGeom>
         </p:spPr>
         <p:txBody>
-          <a:bodyPr anchor="t" rtlCol="false" tIns="0" lIns="0" bIns="0" rIns="0">
+          <a:bodyPr lIns="0" tIns="0" rIns="0" bIns="0" rtlCol="0" anchor="t">
             <a:spAutoFit/>
           </a:bodyPr>
           <a:lstStyle/>
@@ -6485,12 +6777,12 @@
       </p:sp>
       <p:sp>
         <p:nvSpPr>
-          <p:cNvPr name="TextBox 50" id="50"/>
-          <p:cNvSpPr txBox="true"/>
+          <p:cNvPr id="50" name="TextBox 50"/>
+          <p:cNvSpPr txBox="1"/>
           <p:nvPr/>
         </p:nvSpPr>
         <p:spPr>
-          <a:xfrm rot="0">
+          <a:xfrm>
             <a:off x="12984028" y="7210113"/>
             <a:ext cx="4275272" cy="356108"/>
           </a:xfrm>
@@ -6499,7 +6791,7 @@
           </a:prstGeom>
         </p:spPr>
         <p:txBody>
-          <a:bodyPr anchor="t" rtlCol="false" tIns="0" lIns="0" bIns="0" rIns="0">
+          <a:bodyPr lIns="0" tIns="0" rIns="0" bIns="0" rtlCol="0" anchor="t">
             <a:spAutoFit/>
           </a:bodyPr>
           <a:lstStyle/>
@@ -6529,12 +6821,12 @@
       </p:sp>
       <p:sp>
         <p:nvSpPr>
-          <p:cNvPr name="TextBox 51" id="51"/>
-          <p:cNvSpPr txBox="true"/>
+          <p:cNvPr id="51" name="TextBox 51"/>
+          <p:cNvSpPr txBox="1"/>
           <p:nvPr/>
         </p:nvSpPr>
         <p:spPr>
-          <a:xfrm rot="0">
+          <a:xfrm>
             <a:off x="12984028" y="8739129"/>
             <a:ext cx="4275272" cy="356108"/>
           </a:xfrm>
@@ -6543,7 +6835,7 @@
           </a:prstGeom>
         </p:spPr>
         <p:txBody>
-          <a:bodyPr anchor="t" rtlCol="false" tIns="0" lIns="0" bIns="0" rIns="0">
+          <a:bodyPr lIns="0" tIns="0" rIns="0" bIns="0" rtlCol="0" anchor="t">
             <a:spAutoFit/>
           </a:bodyPr>
           <a:lstStyle/>
@@ -6573,12 +6865,12 @@
       </p:sp>
       <p:sp>
         <p:nvSpPr>
-          <p:cNvPr name="TextBox 52" id="52"/>
-          <p:cNvSpPr txBox="true"/>
+          <p:cNvPr id="52" name="TextBox 52"/>
+          <p:cNvSpPr txBox="1"/>
           <p:nvPr/>
         </p:nvSpPr>
         <p:spPr>
-          <a:xfrm rot="0">
+          <a:xfrm>
             <a:off x="3419955" y="1019175"/>
             <a:ext cx="11448090" cy="1107366"/>
           </a:xfrm>
@@ -6587,7 +6879,7 @@
           </a:prstGeom>
         </p:spPr>
         <p:txBody>
-          <a:bodyPr anchor="t" rtlCol="false" tIns="0" lIns="0" bIns="0" rIns="0">
+          <a:bodyPr lIns="0" tIns="0" rIns="0" bIns="0" rtlCol="0" anchor="t">
             <a:spAutoFit/>
           </a:bodyPr>
           <a:lstStyle/>
@@ -6624,13 +6916,14 @@
 </file>
 
 <file path=ppt/slides/slide3.xml><?xml version="1.0" encoding="utf-8"?>
-<p:sld xmlns:p="http://schemas.openxmlformats.org/presentationml/2006/main" xmlns:a="http://schemas.openxmlformats.org/drawingml/2006/main" xmlns:r="http://schemas.openxmlformats.org/officeDocument/2006/relationships">
+<p:sld xmlns:a="http://schemas.openxmlformats.org/drawingml/2006/main" xmlns:r="http://schemas.openxmlformats.org/officeDocument/2006/relationships" xmlns:p="http://schemas.openxmlformats.org/presentationml/2006/main">
   <p:cSld>
     <p:bg>
       <p:bgPr>
         <a:solidFill>
           <a:srgbClr val="F4F4F4"/>
         </a:solidFill>
+        <a:effectLst/>
       </p:bgPr>
     </p:bg>
     <p:spTree>
@@ -6649,12 +6942,12 @@
       </p:grpSpPr>
       <p:sp>
         <p:nvSpPr>
-          <p:cNvPr name="Freeform 2" id="2"/>
+          <p:cNvPr id="2" name="Freeform 2"/>
           <p:cNvSpPr/>
           <p:nvPr/>
         </p:nvSpPr>
         <p:spPr>
-          <a:xfrm flipH="false" flipV="false" rot="0">
+          <a:xfrm>
             <a:off x="10893963" y="2464873"/>
             <a:ext cx="7394037" cy="5357254"/>
           </a:xfrm>
@@ -6663,9 +6956,9 @@
             <a:gdLst/>
             <a:ahLst/>
             <a:cxnLst/>
-            <a:rect r="r" b="b" t="t" l="l"/>
+            <a:rect l="l" t="t" r="r" b="b"/>
             <a:pathLst>
-              <a:path h="5357254" w="7394037">
+              <a:path w="7394037" h="5357254">
                 <a:moveTo>
                   <a:pt x="0" y="0"/>
                 </a:moveTo>
@@ -6688,19 +6981,26 @@
           <a:blipFill>
             <a:blip r:embed="rId2"/>
             <a:stretch>
-              <a:fillRect l="0" t="0" r="0" b="0"/>
+              <a:fillRect/>
             </a:stretch>
           </a:blipFill>
         </p:spPr>
-      </p:sp>
-      <p:sp>
-        <p:nvSpPr>
-          <p:cNvPr name="TextBox 3" id="3"/>
-          <p:cNvSpPr txBox="true"/>
+        <p:txBody>
+          <a:bodyPr/>
+          <a:lstStyle/>
+          <a:p>
+            <a:endParaRPr lang="en-IN"/>
+          </a:p>
+        </p:txBody>
+      </p:sp>
+      <p:sp>
+        <p:nvSpPr>
+          <p:cNvPr id="3" name="TextBox 3"/>
+          <p:cNvSpPr txBox="1"/>
           <p:nvPr/>
         </p:nvSpPr>
         <p:spPr>
-          <a:xfrm rot="0">
+          <a:xfrm>
             <a:off x="5324434" y="1019175"/>
             <a:ext cx="7639132" cy="1107366"/>
           </a:xfrm>
@@ -6709,7 +7009,7 @@
           </a:prstGeom>
         </p:spPr>
         <p:txBody>
-          <a:bodyPr anchor="t" rtlCol="false" tIns="0" lIns="0" bIns="0" rIns="0">
+          <a:bodyPr lIns="0" tIns="0" rIns="0" bIns="0" rtlCol="0" anchor="t">
             <a:spAutoFit/>
           </a:bodyPr>
           <a:lstStyle/>
@@ -6739,12 +7039,12 @@
       </p:sp>
       <p:sp>
         <p:nvSpPr>
-          <p:cNvPr name="TextBox 4" id="4"/>
-          <p:cNvSpPr txBox="true"/>
+          <p:cNvPr id="4" name="TextBox 4"/>
+          <p:cNvSpPr txBox="1"/>
           <p:nvPr/>
         </p:nvSpPr>
         <p:spPr>
-          <a:xfrm rot="0">
+          <a:xfrm>
             <a:off x="1028700" y="2928747"/>
             <a:ext cx="10313370" cy="5524881"/>
           </a:xfrm>
@@ -6753,12 +7053,12 @@
           </a:prstGeom>
         </p:spPr>
         <p:txBody>
-          <a:bodyPr anchor="t" rtlCol="false" tIns="0" lIns="0" bIns="0" rIns="0">
+          <a:bodyPr lIns="0" tIns="0" rIns="0" bIns="0" rtlCol="0" anchor="t">
             <a:spAutoFit/>
           </a:bodyPr>
           <a:lstStyle/>
           <a:p>
-            <a:pPr algn="l" marL="777240" indent="-388620" lvl="1">
+            <a:pPr marL="777240" lvl="1" indent="-388620" algn="l">
               <a:lnSpc>
                 <a:spcPts val="4392"/>
               </a:lnSpc>
@@ -6796,9 +7096,18 @@
                 <a:spcPts val="4392"/>
               </a:lnSpc>
             </a:pPr>
-          </a:p>
-          <a:p>
-            <a:pPr algn="l" marL="777240" indent="-388620" lvl="1">
+            <a:endParaRPr lang="en-US" sz="3600">
+              <a:solidFill>
+                <a:srgbClr val="000000"/>
+              </a:solidFill>
+              <a:latin typeface="Libre Baskerville"/>
+              <a:ea typeface="Libre Baskerville"/>
+              <a:cs typeface="Libre Baskerville"/>
+              <a:sym typeface="Libre Baskerville"/>
+            </a:endParaRPr>
+          </a:p>
+          <a:p>
+            <a:pPr marL="777240" lvl="1" indent="-388620" algn="l">
               <a:lnSpc>
                 <a:spcPts val="4392"/>
               </a:lnSpc>
@@ -6836,9 +7145,18 @@
                 <a:spcPts val="4392"/>
               </a:lnSpc>
             </a:pPr>
-          </a:p>
-          <a:p>
-            <a:pPr algn="l" marL="777240" indent="-388620" lvl="1">
+            <a:endParaRPr lang="en-US" sz="3600">
+              <a:solidFill>
+                <a:srgbClr val="000000"/>
+              </a:solidFill>
+              <a:latin typeface="Libre Baskerville"/>
+              <a:ea typeface="Libre Baskerville"/>
+              <a:cs typeface="Libre Baskerville"/>
+              <a:sym typeface="Libre Baskerville"/>
+            </a:endParaRPr>
+          </a:p>
+          <a:p>
+            <a:pPr marL="777240" lvl="1" indent="-388620" algn="l">
               <a:lnSpc>
                 <a:spcPts val="4392"/>
               </a:lnSpc>
@@ -6881,13 +7199,14 @@
 </file>
 
 <file path=ppt/slides/slide4.xml><?xml version="1.0" encoding="utf-8"?>
-<p:sld xmlns:p="http://schemas.openxmlformats.org/presentationml/2006/main" xmlns:a="http://schemas.openxmlformats.org/drawingml/2006/main">
+<p:sld xmlns:a="http://schemas.openxmlformats.org/drawingml/2006/main" xmlns:r="http://schemas.openxmlformats.org/officeDocument/2006/relationships" xmlns:p="http://schemas.openxmlformats.org/presentationml/2006/main">
   <p:cSld>
     <p:bg>
       <p:bgPr>
         <a:solidFill>
           <a:srgbClr val="F4F4F4"/>
         </a:solidFill>
+        <a:effectLst/>
       </p:bgPr>
     </p:bg>
     <p:spTree>
@@ -6906,12 +7225,12 @@
       </p:grpSpPr>
       <p:sp>
         <p:nvSpPr>
-          <p:cNvPr name="TextBox 2" id="2"/>
-          <p:cNvSpPr txBox="true"/>
+          <p:cNvPr id="2" name="TextBox 2"/>
+          <p:cNvSpPr txBox="1"/>
           <p:nvPr/>
         </p:nvSpPr>
         <p:spPr>
-          <a:xfrm rot="0">
+          <a:xfrm>
             <a:off x="5324434" y="1019175"/>
             <a:ext cx="7639132" cy="1107366"/>
           </a:xfrm>
@@ -6920,7 +7239,7 @@
           </a:prstGeom>
         </p:spPr>
         <p:txBody>
-          <a:bodyPr anchor="t" rtlCol="false" tIns="0" lIns="0" bIns="0" rIns="0">
+          <a:bodyPr lIns="0" tIns="0" rIns="0" bIns="0" rtlCol="0" anchor="t">
             <a:spAutoFit/>
           </a:bodyPr>
           <a:lstStyle/>
@@ -6950,12 +7269,12 @@
       </p:sp>
       <p:sp>
         <p:nvSpPr>
-          <p:cNvPr name="TextBox 3" id="3"/>
-          <p:cNvSpPr txBox="true"/>
+          <p:cNvPr id="3" name="TextBox 3"/>
+          <p:cNvSpPr txBox="1"/>
           <p:nvPr/>
         </p:nvSpPr>
         <p:spPr>
-          <a:xfrm rot="0">
+          <a:xfrm>
             <a:off x="1028700" y="2928747"/>
             <a:ext cx="15795946" cy="7182231"/>
           </a:xfrm>
@@ -6964,12 +7283,12 @@
           </a:prstGeom>
         </p:spPr>
         <p:txBody>
-          <a:bodyPr anchor="t" rtlCol="false" tIns="0" lIns="0" bIns="0" rIns="0">
+          <a:bodyPr lIns="0" tIns="0" rIns="0" bIns="0" rtlCol="0" anchor="t">
             <a:spAutoFit/>
           </a:bodyPr>
           <a:lstStyle/>
           <a:p>
-            <a:pPr algn="l" marL="777240" indent="-388620" lvl="1">
+            <a:pPr marL="777240" lvl="1" indent="-388620" algn="l">
               <a:lnSpc>
                 <a:spcPts val="4392"/>
               </a:lnSpc>
@@ -7007,9 +7326,18 @@
                 <a:spcPts val="4392"/>
               </a:lnSpc>
             </a:pPr>
-          </a:p>
-          <a:p>
-            <a:pPr algn="l" marL="777240" indent="-388620" lvl="1">
+            <a:endParaRPr lang="en-US" sz="3600">
+              <a:solidFill>
+                <a:srgbClr val="000000"/>
+              </a:solidFill>
+              <a:latin typeface="Libre Baskerville"/>
+              <a:ea typeface="Libre Baskerville"/>
+              <a:cs typeface="Libre Baskerville"/>
+              <a:sym typeface="Libre Baskerville"/>
+            </a:endParaRPr>
+          </a:p>
+          <a:p>
+            <a:pPr marL="777240" lvl="1" indent="-388620" algn="l">
               <a:lnSpc>
                 <a:spcPts val="4392"/>
               </a:lnSpc>
@@ -7047,9 +7375,18 @@
                 <a:spcPts val="4392"/>
               </a:lnSpc>
             </a:pPr>
-          </a:p>
-          <a:p>
-            <a:pPr algn="l" marL="777240" indent="-388620" lvl="1">
+            <a:endParaRPr lang="en-US" sz="3600">
+              <a:solidFill>
+                <a:srgbClr val="000000"/>
+              </a:solidFill>
+              <a:latin typeface="Libre Baskerville"/>
+              <a:ea typeface="Libre Baskerville"/>
+              <a:cs typeface="Libre Baskerville"/>
+              <a:sym typeface="Libre Baskerville"/>
+            </a:endParaRPr>
+          </a:p>
+          <a:p>
+            <a:pPr marL="777240" lvl="1" indent="-388620" algn="l">
               <a:lnSpc>
                 <a:spcPts val="4392"/>
               </a:lnSpc>
@@ -7078,7 +7415,44 @@
                 <a:cs typeface="Libre Baskerville"/>
                 <a:sym typeface="Libre Baskerville"/>
               </a:rPr>
-              <a:t>Techniques to prevent overfitting by adding</a:t>
+              <a:t>Techniques to prevent overfitting by adding additional information to constrain the model.</a:t>
+            </a:r>
+          </a:p>
+          <a:p>
+            <a:pPr algn="l">
+              <a:lnSpc>
+                <a:spcPts val="4392"/>
+              </a:lnSpc>
+            </a:pPr>
+            <a:endParaRPr lang="en-US" sz="3600">
+              <a:solidFill>
+                <a:srgbClr val="000000"/>
+              </a:solidFill>
+              <a:latin typeface="Libre Baskerville"/>
+              <a:ea typeface="Libre Baskerville"/>
+              <a:cs typeface="Libre Baskerville"/>
+              <a:sym typeface="Libre Baskerville"/>
+            </a:endParaRPr>
+          </a:p>
+          <a:p>
+            <a:pPr marL="777240" lvl="1" indent="-388620" algn="l">
+              <a:lnSpc>
+                <a:spcPts val="4392"/>
+              </a:lnSpc>
+              <a:buFont typeface="Arial"/>
+              <a:buChar char="•"/>
+            </a:pPr>
+            <a:r>
+              <a:rPr lang="en-US" sz="3600">
+                <a:solidFill>
+                  <a:srgbClr val="000000"/>
+                </a:solidFill>
+                <a:latin typeface="Libre Baskerville Bold"/>
+                <a:ea typeface="Libre Baskerville Bold"/>
+                <a:cs typeface="Libre Baskerville Bold"/>
+                <a:sym typeface="Libre Baskerville Bold"/>
+              </a:rPr>
+              <a:t>Importance:</a:t>
             </a:r>
             <a:r>
               <a:rPr lang="en-US" sz="3600">
@@ -7090,67 +7464,24 @@
                 <a:cs typeface="Libre Baskerville"/>
                 <a:sym typeface="Libre Baskerville"/>
               </a:rPr>
-              <a:t> addi</a:t>
-            </a:r>
-            <a:r>
-              <a:rPr lang="en-US" sz="3600">
-                <a:solidFill>
-                  <a:srgbClr val="000000"/>
-                </a:solidFill>
-                <a:latin typeface="Libre Baskerville"/>
-                <a:ea typeface="Libre Baskerville"/>
-                <a:cs typeface="Libre Baskerville"/>
-                <a:sym typeface="Libre Baskerville"/>
-              </a:rPr>
-              <a:t>tional information to constrain the model.</a:t>
-            </a:r>
-          </a:p>
-          <a:p>
-            <a:pPr algn="l">
+              <a:t> Improves model performance and generalization.</a:t>
+            </a:r>
+          </a:p>
+          <a:p>
+            <a:pPr algn="ctr">
               <a:lnSpc>
                 <a:spcPts val="4392"/>
               </a:lnSpc>
             </a:pPr>
-          </a:p>
-          <a:p>
-            <a:pPr algn="l" marL="777240" indent="-388620" lvl="1">
-              <a:lnSpc>
-                <a:spcPts val="4392"/>
-              </a:lnSpc>
-              <a:buFont typeface="Arial"/>
-              <a:buChar char="•"/>
-            </a:pPr>
-            <a:r>
-              <a:rPr lang="en-US" sz="3600">
-                <a:solidFill>
-                  <a:srgbClr val="000000"/>
-                </a:solidFill>
-                <a:latin typeface="Libre Baskerville Bold"/>
-                <a:ea typeface="Libre Baskerville Bold"/>
-                <a:cs typeface="Libre Baskerville Bold"/>
-                <a:sym typeface="Libre Baskerville Bold"/>
-              </a:rPr>
-              <a:t>Importance:</a:t>
-            </a:r>
-            <a:r>
-              <a:rPr lang="en-US" sz="3600">
-                <a:solidFill>
-                  <a:srgbClr val="000000"/>
-                </a:solidFill>
-                <a:latin typeface="Libre Baskerville"/>
-                <a:ea typeface="Libre Baskerville"/>
-                <a:cs typeface="Libre Baskerville"/>
-                <a:sym typeface="Libre Baskerville"/>
-              </a:rPr>
-              <a:t> Improves model performance and generalization.</a:t>
-            </a:r>
-          </a:p>
-          <a:p>
-            <a:pPr algn="ctr">
-              <a:lnSpc>
-                <a:spcPts val="4392"/>
-              </a:lnSpc>
-            </a:pPr>
+            <a:endParaRPr lang="en-US" sz="3600">
+              <a:solidFill>
+                <a:srgbClr val="000000"/>
+              </a:solidFill>
+              <a:latin typeface="Libre Baskerville"/>
+              <a:ea typeface="Libre Baskerville"/>
+              <a:cs typeface="Libre Baskerville"/>
+              <a:sym typeface="Libre Baskerville"/>
+            </a:endParaRPr>
           </a:p>
         </p:txBody>
       </p:sp>
@@ -7163,13 +7494,14 @@
 </file>
 
 <file path=ppt/slides/slide5.xml><?xml version="1.0" encoding="utf-8"?>
-<p:sld xmlns:p="http://schemas.openxmlformats.org/presentationml/2006/main" xmlns:a="http://schemas.openxmlformats.org/drawingml/2006/main">
+<p:sld xmlns:a="http://schemas.openxmlformats.org/drawingml/2006/main" xmlns:r="http://schemas.openxmlformats.org/officeDocument/2006/relationships" xmlns:p="http://schemas.openxmlformats.org/presentationml/2006/main">
   <p:cSld>
     <p:bg>
       <p:bgPr>
         <a:solidFill>
           <a:srgbClr val="F4F4F4"/>
         </a:solidFill>
+        <a:effectLst/>
       </p:bgPr>
     </p:bg>
     <p:spTree>
@@ -7188,12 +7520,12 @@
       </p:grpSpPr>
       <p:sp>
         <p:nvSpPr>
-          <p:cNvPr name="TextBox 2" id="2"/>
-          <p:cNvSpPr txBox="true"/>
+          <p:cNvPr id="2" name="TextBox 2"/>
+          <p:cNvSpPr txBox="1"/>
           <p:nvPr/>
         </p:nvSpPr>
         <p:spPr>
-          <a:xfrm rot="0">
+          <a:xfrm>
             <a:off x="1028700" y="1019175"/>
             <a:ext cx="15795946" cy="1107366"/>
           </a:xfrm>
@@ -7202,7 +7534,7 @@
           </a:prstGeom>
         </p:spPr>
         <p:txBody>
-          <a:bodyPr anchor="t" rtlCol="false" tIns="0" lIns="0" bIns="0" rIns="0">
+          <a:bodyPr lIns="0" tIns="0" rIns="0" bIns="0" rtlCol="0" anchor="t">
             <a:spAutoFit/>
           </a:bodyPr>
           <a:lstStyle/>
@@ -7232,12 +7564,12 @@
       </p:sp>
       <p:sp>
         <p:nvSpPr>
-          <p:cNvPr name="TextBox 3" id="3"/>
-          <p:cNvSpPr txBox="true"/>
+          <p:cNvPr id="3" name="TextBox 3"/>
+          <p:cNvSpPr txBox="1"/>
           <p:nvPr/>
         </p:nvSpPr>
         <p:spPr>
-          <a:xfrm rot="0">
+          <a:xfrm>
             <a:off x="1028700" y="2447036"/>
             <a:ext cx="15795946" cy="7182231"/>
           </a:xfrm>
@@ -7246,12 +7578,12 @@
           </a:prstGeom>
         </p:spPr>
         <p:txBody>
-          <a:bodyPr anchor="t" rtlCol="false" tIns="0" lIns="0" bIns="0" rIns="0">
+          <a:bodyPr lIns="0" tIns="0" rIns="0" bIns="0" rtlCol="0" anchor="t">
             <a:spAutoFit/>
           </a:bodyPr>
           <a:lstStyle/>
           <a:p>
-            <a:pPr algn="l" marL="777238" indent="-388619" lvl="1">
+            <a:pPr marL="777238" lvl="1" indent="-388619" algn="l">
               <a:lnSpc>
                 <a:spcPts val="4391"/>
               </a:lnSpc>
@@ -7289,9 +7621,18 @@
                 <a:spcPts val="4391"/>
               </a:lnSpc>
             </a:pPr>
-          </a:p>
-          <a:p>
-            <a:pPr algn="l" marL="777238" indent="-388619" lvl="1">
+            <a:endParaRPr lang="en-US" sz="3599">
+              <a:solidFill>
+                <a:srgbClr val="000000"/>
+              </a:solidFill>
+              <a:latin typeface="Libre Baskerville"/>
+              <a:ea typeface="Libre Baskerville"/>
+              <a:cs typeface="Libre Baskerville"/>
+              <a:sym typeface="Libre Baskerville"/>
+            </a:endParaRPr>
+          </a:p>
+          <a:p>
+            <a:pPr marL="777238" lvl="1" indent="-388619" algn="l">
               <a:lnSpc>
                 <a:spcPts val="4391"/>
               </a:lnSpc>
@@ -7329,9 +7670,18 @@
                 <a:spcPts val="4391"/>
               </a:lnSpc>
             </a:pPr>
-          </a:p>
-          <a:p>
-            <a:pPr algn="l" marL="777238" indent="-388619" lvl="1">
+            <a:endParaRPr lang="en-US" sz="3599">
+              <a:solidFill>
+                <a:srgbClr val="000000"/>
+              </a:solidFill>
+              <a:latin typeface="Libre Baskerville"/>
+              <a:ea typeface="Libre Baskerville"/>
+              <a:cs typeface="Libre Baskerville"/>
+              <a:sym typeface="Libre Baskerville"/>
+            </a:endParaRPr>
+          </a:p>
+          <a:p>
+            <a:pPr marL="777238" lvl="1" indent="-388619" algn="l">
               <a:lnSpc>
                 <a:spcPts val="4391"/>
               </a:lnSpc>
@@ -7369,9 +7719,18 @@
                 <a:spcPts val="4391"/>
               </a:lnSpc>
             </a:pPr>
-          </a:p>
-          <a:p>
-            <a:pPr algn="l" marL="777238" indent="-388619" lvl="1">
+            <a:endParaRPr lang="en-US" sz="3599">
+              <a:solidFill>
+                <a:srgbClr val="000000"/>
+              </a:solidFill>
+              <a:latin typeface="Libre Baskerville"/>
+              <a:ea typeface="Libre Baskerville"/>
+              <a:cs typeface="Libre Baskerville"/>
+              <a:sym typeface="Libre Baskerville"/>
+            </a:endParaRPr>
+          </a:p>
+          <a:p>
+            <a:pPr marL="777238" lvl="1" indent="-388619" algn="l">
               <a:lnSpc>
                 <a:spcPts val="4391"/>
               </a:lnSpc>
@@ -7414,13 +7773,14 @@
 </file>
 
 <file path=ppt/slides/slide6.xml><?xml version="1.0" encoding="utf-8"?>
-<p:sld xmlns:p="http://schemas.openxmlformats.org/presentationml/2006/main" xmlns:a="http://schemas.openxmlformats.org/drawingml/2006/main">
+<p:sld xmlns:a="http://schemas.openxmlformats.org/drawingml/2006/main" xmlns:r="http://schemas.openxmlformats.org/officeDocument/2006/relationships" xmlns:p="http://schemas.openxmlformats.org/presentationml/2006/main">
   <p:cSld>
     <p:bg>
       <p:bgPr>
         <a:solidFill>
           <a:srgbClr val="F4F4F4"/>
         </a:solidFill>
+        <a:effectLst/>
       </p:bgPr>
     </p:bg>
     <p:spTree>
@@ -7439,12 +7799,12 @@
       </p:grpSpPr>
       <p:sp>
         <p:nvSpPr>
-          <p:cNvPr name="TextBox 2" id="2"/>
-          <p:cNvSpPr txBox="true"/>
+          <p:cNvPr id="2" name="TextBox 2"/>
+          <p:cNvSpPr txBox="1"/>
           <p:nvPr/>
         </p:nvSpPr>
         <p:spPr>
-          <a:xfrm rot="0">
+          <a:xfrm>
             <a:off x="2603872" y="1019175"/>
             <a:ext cx="12645603" cy="1107366"/>
           </a:xfrm>
@@ -7453,7 +7813,7 @@
           </a:prstGeom>
         </p:spPr>
         <p:txBody>
-          <a:bodyPr anchor="t" rtlCol="false" tIns="0" lIns="0" bIns="0" rIns="0">
+          <a:bodyPr lIns="0" tIns="0" rIns="0" bIns="0" rtlCol="0" anchor="t">
             <a:spAutoFit/>
           </a:bodyPr>
           <a:lstStyle/>
@@ -7483,12 +7843,12 @@
       </p:sp>
       <p:sp>
         <p:nvSpPr>
-          <p:cNvPr name="TextBox 3" id="3"/>
-          <p:cNvSpPr txBox="true"/>
+          <p:cNvPr id="3" name="TextBox 3"/>
+          <p:cNvSpPr txBox="1"/>
           <p:nvPr/>
         </p:nvSpPr>
         <p:spPr>
-          <a:xfrm rot="0">
+          <a:xfrm>
             <a:off x="1028700" y="2928747"/>
             <a:ext cx="15795946" cy="6629781"/>
           </a:xfrm>
@@ -7497,12 +7857,12 @@
           </a:prstGeom>
         </p:spPr>
         <p:txBody>
-          <a:bodyPr anchor="t" rtlCol="false" tIns="0" lIns="0" bIns="0" rIns="0">
+          <a:bodyPr lIns="0" tIns="0" rIns="0" bIns="0" rtlCol="0" anchor="t">
             <a:spAutoFit/>
           </a:bodyPr>
           <a:lstStyle/>
           <a:p>
-            <a:pPr algn="l" marL="777240" indent="-388620" lvl="1">
+            <a:pPr marL="777240" lvl="1" indent="-388620" algn="l">
               <a:lnSpc>
                 <a:spcPts val="4392"/>
               </a:lnSpc>
@@ -7540,9 +7900,18 @@
                 <a:spcPts val="4392"/>
               </a:lnSpc>
             </a:pPr>
-          </a:p>
-          <a:p>
-            <a:pPr algn="l" marL="777240" indent="-388620" lvl="1">
+            <a:endParaRPr lang="en-US" sz="3600">
+              <a:solidFill>
+                <a:srgbClr val="000000"/>
+              </a:solidFill>
+              <a:latin typeface="Libre Baskerville"/>
+              <a:ea typeface="Libre Baskerville"/>
+              <a:cs typeface="Libre Baskerville"/>
+              <a:sym typeface="Libre Baskerville"/>
+            </a:endParaRPr>
+          </a:p>
+          <a:p>
+            <a:pPr marL="777240" lvl="1" indent="-388620" algn="l">
               <a:lnSpc>
                 <a:spcPts val="4392"/>
               </a:lnSpc>
@@ -7580,9 +7949,18 @@
                 <a:spcPts val="4392"/>
               </a:lnSpc>
             </a:pPr>
-          </a:p>
-          <a:p>
-            <a:pPr algn="l" marL="777240" indent="-388620" lvl="1">
+            <a:endParaRPr lang="en-US" sz="3600">
+              <a:solidFill>
+                <a:srgbClr val="000000"/>
+              </a:solidFill>
+              <a:latin typeface="Libre Baskerville"/>
+              <a:ea typeface="Libre Baskerville"/>
+              <a:cs typeface="Libre Baskerville"/>
+              <a:sym typeface="Libre Baskerville"/>
+            </a:endParaRPr>
+          </a:p>
+          <a:p>
+            <a:pPr marL="777240" lvl="1" indent="-388620" algn="l">
               <a:lnSpc>
                 <a:spcPts val="4392"/>
               </a:lnSpc>
@@ -7620,9 +7998,18 @@
                 <a:spcPts val="4392"/>
               </a:lnSpc>
             </a:pPr>
-          </a:p>
-          <a:p>
-            <a:pPr algn="l" marL="777240" indent="-388620" lvl="1">
+            <a:endParaRPr lang="en-US" sz="3600">
+              <a:solidFill>
+                <a:srgbClr val="000000"/>
+              </a:solidFill>
+              <a:latin typeface="Libre Baskerville"/>
+              <a:ea typeface="Libre Baskerville"/>
+              <a:cs typeface="Libre Baskerville"/>
+              <a:sym typeface="Libre Baskerville"/>
+            </a:endParaRPr>
+          </a:p>
+          <a:p>
+            <a:pPr marL="777240" lvl="1" indent="-388620" algn="l">
               <a:lnSpc>
                 <a:spcPts val="4392"/>
               </a:lnSpc>
@@ -7665,13 +8052,14 @@
 </file>
 
 <file path=ppt/slides/slide7.xml><?xml version="1.0" encoding="utf-8"?>
-<p:sld xmlns:p="http://schemas.openxmlformats.org/presentationml/2006/main" xmlns:a="http://schemas.openxmlformats.org/drawingml/2006/main">
+<p:sld xmlns:a="http://schemas.openxmlformats.org/drawingml/2006/main" xmlns:r="http://schemas.openxmlformats.org/officeDocument/2006/relationships" xmlns:p="http://schemas.openxmlformats.org/presentationml/2006/main">
   <p:cSld>
     <p:bg>
       <p:bgPr>
         <a:solidFill>
           <a:srgbClr val="F4F4F4"/>
         </a:solidFill>
+        <a:effectLst/>
       </p:bgPr>
     </p:bg>
     <p:spTree>
@@ -7690,12 +8078,12 @@
       </p:grpSpPr>
       <p:sp>
         <p:nvSpPr>
-          <p:cNvPr name="TextBox 2" id="2"/>
-          <p:cNvSpPr txBox="true"/>
+          <p:cNvPr id="2" name="TextBox 2"/>
+          <p:cNvSpPr txBox="1"/>
           <p:nvPr/>
         </p:nvSpPr>
         <p:spPr>
-          <a:xfrm rot="0">
+          <a:xfrm>
             <a:off x="2603872" y="1019175"/>
             <a:ext cx="12645603" cy="1107366"/>
           </a:xfrm>
@@ -7704,7 +8092,7 @@
           </a:prstGeom>
         </p:spPr>
         <p:txBody>
-          <a:bodyPr anchor="t" rtlCol="false" tIns="0" lIns="0" bIns="0" rIns="0">
+          <a:bodyPr lIns="0" tIns="0" rIns="0" bIns="0" rtlCol="0" anchor="t">
             <a:spAutoFit/>
           </a:bodyPr>
           <a:lstStyle/>
@@ -7734,12 +8122,12 @@
       </p:sp>
       <p:sp>
         <p:nvSpPr>
-          <p:cNvPr name="TextBox 3" id="3"/>
-          <p:cNvSpPr txBox="true"/>
+          <p:cNvPr id="3" name="TextBox 3"/>
+          <p:cNvSpPr txBox="1"/>
           <p:nvPr/>
         </p:nvSpPr>
         <p:spPr>
-          <a:xfrm rot="0">
+          <a:xfrm>
             <a:off x="1028700" y="2598166"/>
             <a:ext cx="15795946" cy="6660134"/>
           </a:xfrm>
@@ -7748,12 +8136,12 @@
           </a:prstGeom>
         </p:spPr>
         <p:txBody>
-          <a:bodyPr anchor="t" rtlCol="false" tIns="0" lIns="0" bIns="0" rIns="0">
+          <a:bodyPr lIns="0" tIns="0" rIns="0" bIns="0" rtlCol="0" anchor="t">
             <a:spAutoFit/>
           </a:bodyPr>
           <a:lstStyle/>
           <a:p>
-            <a:pPr algn="l" marL="734059" indent="-367030" lvl="1">
+            <a:pPr marL="734059" lvl="1" indent="-367030" algn="l">
               <a:lnSpc>
                 <a:spcPts val="4147"/>
               </a:lnSpc>
@@ -7791,9 +8179,18 @@
                 <a:spcPts val="4147"/>
               </a:lnSpc>
             </a:pPr>
-          </a:p>
-          <a:p>
-            <a:pPr algn="l" marL="734059" indent="-367030" lvl="1">
+            <a:endParaRPr lang="en-US" sz="3399">
+              <a:solidFill>
+                <a:srgbClr val="000000"/>
+              </a:solidFill>
+              <a:latin typeface="Libre Baskerville"/>
+              <a:ea typeface="Libre Baskerville"/>
+              <a:cs typeface="Libre Baskerville"/>
+              <a:sym typeface="Libre Baskerville"/>
+            </a:endParaRPr>
+          </a:p>
+          <a:p>
+            <a:pPr marL="734059" lvl="1" indent="-367030" algn="l">
               <a:lnSpc>
                 <a:spcPts val="4147"/>
               </a:lnSpc>
@@ -7831,9 +8228,18 @@
                 <a:spcPts val="4147"/>
               </a:lnSpc>
             </a:pPr>
-          </a:p>
-          <a:p>
-            <a:pPr algn="l" marL="734059" indent="-367030" lvl="1">
+            <a:endParaRPr lang="en-US" sz="3399">
+              <a:solidFill>
+                <a:srgbClr val="000000"/>
+              </a:solidFill>
+              <a:latin typeface="Libre Baskerville"/>
+              <a:ea typeface="Libre Baskerville"/>
+              <a:cs typeface="Libre Baskerville"/>
+              <a:sym typeface="Libre Baskerville"/>
+            </a:endParaRPr>
+          </a:p>
+          <a:p>
+            <a:pPr marL="734059" lvl="1" indent="-367030" algn="l">
               <a:lnSpc>
                 <a:spcPts val="4147"/>
               </a:lnSpc>
@@ -7850,8 +8256,45 @@
                 <a:cs typeface="Libre Baskerville Bold"/>
                 <a:sym typeface="Libre Baskerville Bold"/>
               </a:rPr>
-              <a:t>Learning Rate Scheduling</a:t>
-            </a:r>
+              <a:t>Learning Rate Scheduling: </a:t>
+            </a:r>
+            <a:r>
+              <a:rPr lang="en-US" sz="3399">
+                <a:solidFill>
+                  <a:srgbClr val="000000"/>
+                </a:solidFill>
+                <a:latin typeface="Libre Baskerville"/>
+                <a:ea typeface="Libre Baskerville"/>
+                <a:cs typeface="Libre Baskerville"/>
+                <a:sym typeface="Libre Baskerville"/>
+              </a:rPr>
+              <a:t>Dynamically adjusts the learning rate during training to improve convergence.</a:t>
+            </a:r>
+          </a:p>
+          <a:p>
+            <a:pPr algn="l">
+              <a:lnSpc>
+                <a:spcPts val="4147"/>
+              </a:lnSpc>
+            </a:pPr>
+            <a:endParaRPr lang="en-US" sz="3399">
+              <a:solidFill>
+                <a:srgbClr val="000000"/>
+              </a:solidFill>
+              <a:latin typeface="Libre Baskerville"/>
+              <a:ea typeface="Libre Baskerville"/>
+              <a:cs typeface="Libre Baskerville"/>
+              <a:sym typeface="Libre Baskerville"/>
+            </a:endParaRPr>
+          </a:p>
+          <a:p>
+            <a:pPr marL="734059" lvl="1" indent="-367030" algn="l">
+              <a:lnSpc>
+                <a:spcPts val="4147"/>
+              </a:lnSpc>
+              <a:buFont typeface="Arial"/>
+              <a:buChar char="•"/>
+            </a:pPr>
             <a:r>
               <a:rPr lang="en-US" sz="3399">
                 <a:solidFill>
@@ -7862,7 +8305,7 @@
                 <a:cs typeface="Libre Baskerville Bold"/>
                 <a:sym typeface="Libre Baskerville Bold"/>
               </a:rPr>
-              <a:t>: </a:t>
+              <a:t>Early Stopping:</a:t>
             </a:r>
             <a:r>
               <a:rPr lang="en-US" sz="3399">
@@ -7874,58 +8317,6 @@
                 <a:cs typeface="Libre Baskerville"/>
                 <a:sym typeface="Libre Baskerville"/>
               </a:rPr>
-              <a:t>Dynamically adjusts the learning rate during training to improve convergence.</a:t>
-            </a:r>
-          </a:p>
-          <a:p>
-            <a:pPr algn="l">
-              <a:lnSpc>
-                <a:spcPts val="4147"/>
-              </a:lnSpc>
-            </a:pPr>
-          </a:p>
-          <a:p>
-            <a:pPr algn="l" marL="734059" indent="-367030" lvl="1">
-              <a:lnSpc>
-                <a:spcPts val="4147"/>
-              </a:lnSpc>
-              <a:buFont typeface="Arial"/>
-              <a:buChar char="•"/>
-            </a:pPr>
-            <a:r>
-              <a:rPr lang="en-US" sz="3399">
-                <a:solidFill>
-                  <a:srgbClr val="000000"/>
-                </a:solidFill>
-                <a:latin typeface="Libre Baskerville Bold"/>
-                <a:ea typeface="Libre Baskerville Bold"/>
-                <a:cs typeface="Libre Baskerville Bold"/>
-                <a:sym typeface="Libre Baskerville Bold"/>
-              </a:rPr>
-              <a:t>Early Stopping</a:t>
-            </a:r>
-            <a:r>
-              <a:rPr lang="en-US" sz="3399">
-                <a:solidFill>
-                  <a:srgbClr val="000000"/>
-                </a:solidFill>
-                <a:latin typeface="Libre Baskerville Bold"/>
-                <a:ea typeface="Libre Baskerville Bold"/>
-                <a:cs typeface="Libre Baskerville Bold"/>
-                <a:sym typeface="Libre Baskerville Bold"/>
-              </a:rPr>
-              <a:t>:</a:t>
-            </a:r>
-            <a:r>
-              <a:rPr lang="en-US" sz="3399">
-                <a:solidFill>
-                  <a:srgbClr val="000000"/>
-                </a:solidFill>
-                <a:latin typeface="Libre Baskerville"/>
-                <a:ea typeface="Libre Baskerville"/>
-                <a:cs typeface="Libre Baskerville"/>
-                <a:sym typeface="Libre Baskerville"/>
-              </a:rPr>
               <a:t> Stops training when a monitored metric has stopped improving, preventing overfitting.</a:t>
             </a:r>
           </a:p>
@@ -7935,6 +8326,15 @@
                 <a:spcPts val="2928"/>
               </a:lnSpc>
             </a:pPr>
+            <a:endParaRPr lang="en-US" sz="3399">
+              <a:solidFill>
+                <a:srgbClr val="000000"/>
+              </a:solidFill>
+              <a:latin typeface="Libre Baskerville"/>
+              <a:ea typeface="Libre Baskerville"/>
+              <a:cs typeface="Libre Baskerville"/>
+              <a:sym typeface="Libre Baskerville"/>
+            </a:endParaRPr>
           </a:p>
         </p:txBody>
       </p:sp>
@@ -7947,13 +8347,14 @@
 </file>
 
 <file path=ppt/slides/slide8.xml><?xml version="1.0" encoding="utf-8"?>
-<p:sld xmlns:p="http://schemas.openxmlformats.org/presentationml/2006/main" xmlns:a="http://schemas.openxmlformats.org/drawingml/2006/main">
+<p:sld xmlns:a="http://schemas.openxmlformats.org/drawingml/2006/main" xmlns:r="http://schemas.openxmlformats.org/officeDocument/2006/relationships" xmlns:p="http://schemas.openxmlformats.org/presentationml/2006/main">
   <p:cSld>
     <p:bg>
       <p:bgPr>
         <a:solidFill>
           <a:srgbClr val="F4F4F4"/>
         </a:solidFill>
+        <a:effectLst/>
       </p:bgPr>
     </p:bg>
     <p:spTree>
@@ -7972,12 +8373,12 @@
       </p:grpSpPr>
       <p:sp>
         <p:nvSpPr>
-          <p:cNvPr name="TextBox 2" id="2"/>
-          <p:cNvSpPr txBox="true"/>
+          <p:cNvPr id="2" name="TextBox 2"/>
+          <p:cNvSpPr txBox="1"/>
           <p:nvPr/>
         </p:nvSpPr>
         <p:spPr>
-          <a:xfrm rot="0">
+          <a:xfrm>
             <a:off x="2603872" y="1019175"/>
             <a:ext cx="12645603" cy="1107366"/>
           </a:xfrm>
@@ -7986,7 +8387,7 @@
           </a:prstGeom>
         </p:spPr>
         <p:txBody>
-          <a:bodyPr anchor="t" rtlCol="false" tIns="0" lIns="0" bIns="0" rIns="0">
+          <a:bodyPr lIns="0" tIns="0" rIns="0" bIns="0" rtlCol="0" anchor="t">
             <a:spAutoFit/>
           </a:bodyPr>
           <a:lstStyle/>
@@ -8016,12 +8417,12 @@
       </p:sp>
       <p:sp>
         <p:nvSpPr>
-          <p:cNvPr name="TextBox 3" id="3"/>
-          <p:cNvSpPr txBox="true"/>
+          <p:cNvPr id="3" name="TextBox 3"/>
+          <p:cNvSpPr txBox="1"/>
           <p:nvPr/>
         </p:nvSpPr>
         <p:spPr>
-          <a:xfrm rot="0">
+          <a:xfrm>
             <a:off x="1028700" y="2928747"/>
             <a:ext cx="15795946" cy="6077331"/>
           </a:xfrm>
@@ -8030,12 +8431,12 @@
           </a:prstGeom>
         </p:spPr>
         <p:txBody>
-          <a:bodyPr anchor="t" rtlCol="false" tIns="0" lIns="0" bIns="0" rIns="0">
+          <a:bodyPr lIns="0" tIns="0" rIns="0" bIns="0" rtlCol="0" anchor="t">
             <a:spAutoFit/>
           </a:bodyPr>
           <a:lstStyle/>
           <a:p>
-            <a:pPr algn="l" marL="777240" indent="-388620" lvl="1">
+            <a:pPr marL="777240" lvl="1" indent="-388620" algn="l">
               <a:lnSpc>
                 <a:spcPts val="4392"/>
               </a:lnSpc>
@@ -8073,9 +8474,18 @@
                 <a:spcPts val="4392"/>
               </a:lnSpc>
             </a:pPr>
-          </a:p>
-          <a:p>
-            <a:pPr algn="l" marL="777240" indent="-388620" lvl="1">
+            <a:endParaRPr lang="en-US" sz="3600">
+              <a:solidFill>
+                <a:srgbClr val="000000"/>
+              </a:solidFill>
+              <a:latin typeface="Libre Baskerville"/>
+              <a:ea typeface="Libre Baskerville"/>
+              <a:cs typeface="Libre Baskerville"/>
+              <a:sym typeface="Libre Baskerville"/>
+            </a:endParaRPr>
+          </a:p>
+          <a:p>
+            <a:pPr marL="777240" lvl="1" indent="-388620" algn="l">
               <a:lnSpc>
                 <a:spcPts val="4392"/>
               </a:lnSpc>
@@ -8113,9 +8523,18 @@
                 <a:spcPts val="4392"/>
               </a:lnSpc>
             </a:pPr>
-          </a:p>
-          <a:p>
-            <a:pPr algn="l" marL="777240" indent="-388620" lvl="1">
+            <a:endParaRPr lang="en-US" sz="3600">
+              <a:solidFill>
+                <a:srgbClr val="000000"/>
+              </a:solidFill>
+              <a:latin typeface="Libre Baskerville"/>
+              <a:ea typeface="Libre Baskerville"/>
+              <a:cs typeface="Libre Baskerville"/>
+              <a:sym typeface="Libre Baskerville"/>
+            </a:endParaRPr>
+          </a:p>
+          <a:p>
+            <a:pPr marL="777240" lvl="1" indent="-388620" algn="l">
               <a:lnSpc>
                 <a:spcPts val="4392"/>
               </a:lnSpc>
@@ -8158,13 +8577,14 @@
 </file>
 
 <file path=ppt/slides/slide9.xml><?xml version="1.0" encoding="utf-8"?>
-<p:sld xmlns:p="http://schemas.openxmlformats.org/presentationml/2006/main" xmlns:a="http://schemas.openxmlformats.org/drawingml/2006/main">
+<p:sld xmlns:a="http://schemas.openxmlformats.org/drawingml/2006/main" xmlns:r="http://schemas.openxmlformats.org/officeDocument/2006/relationships" xmlns:p="http://schemas.openxmlformats.org/presentationml/2006/main">
   <p:cSld>
     <p:bg>
       <p:bgPr>
         <a:solidFill>
           <a:srgbClr val="F4F4F4"/>
         </a:solidFill>
+        <a:effectLst/>
       </p:bgPr>
     </p:bg>
     <p:spTree>
@@ -8183,12 +8603,12 @@
       </p:grpSpPr>
       <p:sp>
         <p:nvSpPr>
-          <p:cNvPr name="TextBox 2" id="2"/>
-          <p:cNvSpPr txBox="true"/>
+          <p:cNvPr id="2" name="TextBox 2"/>
+          <p:cNvSpPr txBox="1"/>
           <p:nvPr/>
         </p:nvSpPr>
         <p:spPr>
-          <a:xfrm rot="0">
+          <a:xfrm>
             <a:off x="1028700" y="1019175"/>
             <a:ext cx="15795946" cy="1107366"/>
           </a:xfrm>
@@ -8197,7 +8617,7 @@
           </a:prstGeom>
         </p:spPr>
         <p:txBody>
-          <a:bodyPr anchor="t" rtlCol="false" tIns="0" lIns="0" bIns="0" rIns="0">
+          <a:bodyPr lIns="0" tIns="0" rIns="0" bIns="0" rtlCol="0" anchor="t">
             <a:spAutoFit/>
           </a:bodyPr>
           <a:lstStyle/>
@@ -8227,26 +8647,26 @@
       </p:sp>
       <p:sp>
         <p:nvSpPr>
-          <p:cNvPr name="TextBox 3" id="3"/>
-          <p:cNvSpPr txBox="true"/>
+          <p:cNvPr id="3" name="TextBox 3"/>
+          <p:cNvSpPr txBox="1"/>
           <p:nvPr/>
         </p:nvSpPr>
         <p:spPr>
-          <a:xfrm rot="0">
+          <a:xfrm>
             <a:off x="1028700" y="2654617"/>
-            <a:ext cx="15795946" cy="6936613"/>
+            <a:ext cx="15795946" cy="6186374"/>
           </a:xfrm>
           <a:prstGeom prst="rect">
             <a:avLst/>
           </a:prstGeom>
         </p:spPr>
         <p:txBody>
-          <a:bodyPr anchor="t" rtlCol="false" tIns="0" lIns="0" bIns="0" rIns="0">
+          <a:bodyPr lIns="0" tIns="0" rIns="0" bIns="0" rtlCol="0" anchor="t">
             <a:spAutoFit/>
           </a:bodyPr>
           <a:lstStyle/>
           <a:p>
-            <a:pPr algn="l" marL="777240" indent="-388620" lvl="1">
+            <a:pPr marL="777240" lvl="1" indent="-388620" algn="l">
               <a:lnSpc>
                 <a:spcPts val="4392"/>
               </a:lnSpc>
@@ -8254,7 +8674,7 @@
               <a:buChar char="•"/>
             </a:pPr>
             <a:r>
-              <a:rPr lang="en-US" sz="3600">
+              <a:rPr lang="en-US" sz="3600" dirty="0">
                 <a:solidFill>
                   <a:srgbClr val="000000"/>
                 </a:solidFill>
@@ -8266,7 +8686,7 @@
               <a:t>Dropout: </a:t>
             </a:r>
             <a:r>
-              <a:rPr lang="en-US" sz="3600">
+              <a:rPr lang="en-US" sz="3600" dirty="0">
                 <a:solidFill>
                   <a:srgbClr val="000000"/>
                 </a:solidFill>
@@ -8284,9 +8704,18 @@
                 <a:spcPts val="4392"/>
               </a:lnSpc>
             </a:pPr>
-          </a:p>
-          <a:p>
-            <a:pPr algn="l" marL="777240" indent="-388620" lvl="1">
+            <a:endParaRPr lang="en-US" sz="3600" dirty="0">
+              <a:solidFill>
+                <a:srgbClr val="000000"/>
+              </a:solidFill>
+              <a:latin typeface="Libre Baskerville"/>
+              <a:ea typeface="Libre Baskerville"/>
+              <a:cs typeface="Libre Baskerville"/>
+              <a:sym typeface="Libre Baskerville"/>
+            </a:endParaRPr>
+          </a:p>
+          <a:p>
+            <a:pPr marL="777240" lvl="1" indent="-388620" algn="l">
               <a:lnSpc>
                 <a:spcPts val="4392"/>
               </a:lnSpc>
@@ -8294,7 +8723,7 @@
               <a:buChar char="•"/>
             </a:pPr>
             <a:r>
-              <a:rPr lang="en-US" sz="3600">
+              <a:rPr lang="en-US" sz="3600" dirty="0">
                 <a:solidFill>
                   <a:srgbClr val="000000"/>
                 </a:solidFill>
@@ -8306,7 +8735,7 @@
               <a:t>L1/Lasso Regularization: </a:t>
             </a:r>
             <a:r>
-              <a:rPr lang="en-US" sz="3600">
+              <a:rPr lang="en-US" sz="3600" dirty="0">
                 <a:solidFill>
                   <a:srgbClr val="000000"/>
                 </a:solidFill>
@@ -8324,9 +8753,18 @@
                 <a:spcPts val="4392"/>
               </a:lnSpc>
             </a:pPr>
-          </a:p>
-          <a:p>
-            <a:pPr algn="l" marL="777240" indent="-388620" lvl="1">
+            <a:endParaRPr lang="en-US" sz="3600" dirty="0">
+              <a:solidFill>
+                <a:srgbClr val="000000"/>
+              </a:solidFill>
+              <a:latin typeface="Libre Baskerville"/>
+              <a:ea typeface="Libre Baskerville"/>
+              <a:cs typeface="Libre Baskerville"/>
+              <a:sym typeface="Libre Baskerville"/>
+            </a:endParaRPr>
+          </a:p>
+          <a:p>
+            <a:pPr marL="777240" lvl="1" indent="-388620" algn="l">
               <a:lnSpc>
                 <a:spcPts val="4392"/>
               </a:lnSpc>
@@ -8334,7 +8772,7 @@
               <a:buChar char="•"/>
             </a:pPr>
             <a:r>
-              <a:rPr lang="en-US" sz="3600">
+              <a:rPr lang="en-US" sz="3600" dirty="0">
                 <a:solidFill>
                   <a:srgbClr val="000000"/>
                 </a:solidFill>
@@ -8346,7 +8784,7 @@
               <a:t>L2 Regularization: </a:t>
             </a:r>
             <a:r>
-              <a:rPr lang="en-US" sz="3600">
+              <a:rPr lang="en-US" sz="3600" dirty="0">
                 <a:solidFill>
                   <a:srgbClr val="000000"/>
                 </a:solidFill>
@@ -8356,32 +8794,6 @@
                 <a:sym typeface="Libre Baskerville"/>
               </a:rPr>
               <a:t>Penalizes large coefficients and constrains their magnitudes, preventing models from becoming overly complex.</a:t>
-            </a:r>
-          </a:p>
-          <a:p>
-            <a:pPr algn="l">
-              <a:lnSpc>
-                <a:spcPts val="4392"/>
-              </a:lnSpc>
-            </a:pPr>
-          </a:p>
-          <a:p>
-            <a:pPr algn="ctr">
-              <a:lnSpc>
-                <a:spcPts val="2440"/>
-              </a:lnSpc>
-            </a:pPr>
-            <a:r>
-              <a:rPr lang="en-US" sz="2000">
-                <a:solidFill>
-                  <a:srgbClr val="8C52FF"/>
-                </a:solidFill>
-                <a:latin typeface="Libre Baskerville Bold"/>
-                <a:ea typeface="Libre Baskerville Bold"/>
-                <a:cs typeface="Libre Baskerville Bold"/>
-                <a:sym typeface="Libre Baskerville Bold"/>
-              </a:rPr>
-              <a:t>https://colab.research.google.com/drive/14CKItbXtE3FprIXAEaDP38H6LMwgOx3t?usp=sharing</a:t>
             </a:r>
           </a:p>
         </p:txBody>

</xml_diff>